<commit_message>
téma megtalálása és a sablon elkészítése
</commit_message>
<xml_diff>
--- a/beadandóTG.pptx
+++ b/beadandóTG.pptx
@@ -2,7 +2,7 @@
 <file path=ppt/presentation.xml><?xml version="1.0" encoding="utf-8"?>
 <p:presentation xmlns:a="http://schemas.openxmlformats.org/drawingml/2006/main" xmlns:r="http://schemas.openxmlformats.org/officeDocument/2006/relationships" xmlns:p="http://schemas.openxmlformats.org/presentationml/2006/main" saveSubsetFonts="1">
   <p:sldMasterIdLst>
-    <p:sldMasterId id="2147483648" r:id="rId1"/>
+    <p:sldMasterId id="2147483672" r:id="rId1"/>
   </p:sldMasterIdLst>
   <p:sldIdLst>
     <p:sldId id="256" r:id="rId2"/>
@@ -11,16 +11,17 @@
     <p:sldId id="259" r:id="rId5"/>
     <p:sldId id="260" r:id="rId6"/>
     <p:sldId id="261" r:id="rId7"/>
-    <p:sldId id="262" r:id="rId8"/>
-    <p:sldId id="263" r:id="rId9"/>
+    <p:sldId id="263" r:id="rId8"/>
+    <p:sldId id="262" r:id="rId9"/>
+    <p:sldId id="264" r:id="rId10"/>
   </p:sldIdLst>
   <p:sldSz cx="12192000" cy="6858000"/>
   <p:notesSz cx="6858000" cy="9144000"/>
   <p:defaultTextStyle>
     <a:defPPr>
-      <a:defRPr lang="hu-HU"/>
+      <a:defRPr lang="en-US"/>
     </a:defPPr>
-    <a:lvl1pPr marL="0" algn="l" defTabSz="914400" rtl="0" eaLnBrk="1" latinLnBrk="0" hangingPunct="1">
+    <a:lvl1pPr marL="0" algn="l" defTabSz="457200" rtl="0" eaLnBrk="1" latinLnBrk="0" hangingPunct="1">
       <a:defRPr sz="1800" kern="1200">
         <a:solidFill>
           <a:schemeClr val="tx1"/>
@@ -30,7 +31,7 @@
         <a:cs typeface="+mn-cs"/>
       </a:defRPr>
     </a:lvl1pPr>
-    <a:lvl2pPr marL="457200" algn="l" defTabSz="914400" rtl="0" eaLnBrk="1" latinLnBrk="0" hangingPunct="1">
+    <a:lvl2pPr marL="457200" algn="l" defTabSz="457200" rtl="0" eaLnBrk="1" latinLnBrk="0" hangingPunct="1">
       <a:defRPr sz="1800" kern="1200">
         <a:solidFill>
           <a:schemeClr val="tx1"/>
@@ -40,7 +41,7 @@
         <a:cs typeface="+mn-cs"/>
       </a:defRPr>
     </a:lvl2pPr>
-    <a:lvl3pPr marL="914400" algn="l" defTabSz="914400" rtl="0" eaLnBrk="1" latinLnBrk="0" hangingPunct="1">
+    <a:lvl3pPr marL="914400" algn="l" defTabSz="457200" rtl="0" eaLnBrk="1" latinLnBrk="0" hangingPunct="1">
       <a:defRPr sz="1800" kern="1200">
         <a:solidFill>
           <a:schemeClr val="tx1"/>
@@ -50,7 +51,7 @@
         <a:cs typeface="+mn-cs"/>
       </a:defRPr>
     </a:lvl3pPr>
-    <a:lvl4pPr marL="1371600" algn="l" defTabSz="914400" rtl="0" eaLnBrk="1" latinLnBrk="0" hangingPunct="1">
+    <a:lvl4pPr marL="1371600" algn="l" defTabSz="457200" rtl="0" eaLnBrk="1" latinLnBrk="0" hangingPunct="1">
       <a:defRPr sz="1800" kern="1200">
         <a:solidFill>
           <a:schemeClr val="tx1"/>
@@ -60,7 +61,7 @@
         <a:cs typeface="+mn-cs"/>
       </a:defRPr>
     </a:lvl4pPr>
-    <a:lvl5pPr marL="1828800" algn="l" defTabSz="914400" rtl="0" eaLnBrk="1" latinLnBrk="0" hangingPunct="1">
+    <a:lvl5pPr marL="1828800" algn="l" defTabSz="457200" rtl="0" eaLnBrk="1" latinLnBrk="0" hangingPunct="1">
       <a:defRPr sz="1800" kern="1200">
         <a:solidFill>
           <a:schemeClr val="tx1"/>
@@ -70,7 +71,7 @@
         <a:cs typeface="+mn-cs"/>
       </a:defRPr>
     </a:lvl5pPr>
-    <a:lvl6pPr marL="2286000" algn="l" defTabSz="914400" rtl="0" eaLnBrk="1" latinLnBrk="0" hangingPunct="1">
+    <a:lvl6pPr marL="2286000" algn="l" defTabSz="457200" rtl="0" eaLnBrk="1" latinLnBrk="0" hangingPunct="1">
       <a:defRPr sz="1800" kern="1200">
         <a:solidFill>
           <a:schemeClr val="tx1"/>
@@ -80,7 +81,7 @@
         <a:cs typeface="+mn-cs"/>
       </a:defRPr>
     </a:lvl6pPr>
-    <a:lvl7pPr marL="2743200" algn="l" defTabSz="914400" rtl="0" eaLnBrk="1" latinLnBrk="0" hangingPunct="1">
+    <a:lvl7pPr marL="2743200" algn="l" defTabSz="457200" rtl="0" eaLnBrk="1" latinLnBrk="0" hangingPunct="1">
       <a:defRPr sz="1800" kern="1200">
         <a:solidFill>
           <a:schemeClr val="tx1"/>
@@ -90,7 +91,7 @@
         <a:cs typeface="+mn-cs"/>
       </a:defRPr>
     </a:lvl7pPr>
-    <a:lvl8pPr marL="3200400" algn="l" defTabSz="914400" rtl="0" eaLnBrk="1" latinLnBrk="0" hangingPunct="1">
+    <a:lvl8pPr marL="3200400" algn="l" defTabSz="457200" rtl="0" eaLnBrk="1" latinLnBrk="0" hangingPunct="1">
       <a:defRPr sz="1800" kern="1200">
         <a:solidFill>
           <a:schemeClr val="tx1"/>
@@ -100,7 +101,7 @@
         <a:cs typeface="+mn-cs"/>
       </a:defRPr>
     </a:lvl8pPr>
-    <a:lvl9pPr marL="3657600" algn="l" defTabSz="914400" rtl="0" eaLnBrk="1" latinLnBrk="0" hangingPunct="1">
+    <a:lvl9pPr marL="3657600" algn="l" defTabSz="457200" rtl="0" eaLnBrk="1" latinLnBrk="0" hangingPunct="1">
       <a:defRPr sz="1800" kern="1200">
         <a:solidFill>
           <a:schemeClr val="tx1"/>
@@ -111,6 +112,11 @@
       </a:defRPr>
     </a:lvl9pPr>
   </p:defaultTextStyle>
+  <p:extLst>
+    <p:ext uri="{EFAFB233-063F-42B5-8137-9DF3F51BA10A}">
+      <p15:sldGuideLst xmlns:p15="http://schemas.microsoft.com/office/powerpoint/2012/main"/>
+    </p:ext>
+  </p:extLst>
 </p:presentation>
 </file>
 
@@ -133,7 +139,7 @@
       </p:grpSpPr>
       <p:sp>
         <p:nvSpPr>
-          <p:cNvPr id="2" name="Cím 1"/>
+          <p:cNvPr id="2" name="Title 1"/>
           <p:cNvSpPr>
             <a:spLocks noGrp="1"/>
           </p:cNvSpPr>
@@ -159,13 +165,13 @@
               <a:rPr lang="hu-HU" smtClean="0"/>
               <a:t>Mintacím szerkesztése</a:t>
             </a:r>
-            <a:endParaRPr lang="hu-HU"/>
-          </a:p>
-        </p:txBody>
-      </p:sp>
-      <p:sp>
-        <p:nvSpPr>
-          <p:cNvPr id="3" name="Alcím 2"/>
+            <a:endParaRPr lang="en-US" dirty="0"/>
+          </a:p>
+        </p:txBody>
+      </p:sp>
+      <p:sp>
+        <p:nvSpPr>
+          <p:cNvPr id="3" name="Subtitle 2"/>
           <p:cNvSpPr>
             <a:spLocks noGrp="1"/>
           </p:cNvSpPr>
@@ -224,13 +230,13 @@
               <a:rPr lang="hu-HU" smtClean="0"/>
               <a:t>Kattintson ide az alcím mintájának szerkesztéséhez</a:t>
             </a:r>
-            <a:endParaRPr lang="hu-HU"/>
-          </a:p>
-        </p:txBody>
-      </p:sp>
-      <p:sp>
-        <p:nvSpPr>
-          <p:cNvPr id="4" name="Dátum helye 3"/>
+            <a:endParaRPr lang="en-US" dirty="0"/>
+          </a:p>
+        </p:txBody>
+      </p:sp>
+      <p:sp>
+        <p:nvSpPr>
+          <p:cNvPr id="4" name="Date Placeholder 3"/>
           <p:cNvSpPr>
             <a:spLocks noGrp="1"/>
           </p:cNvSpPr>
@@ -245,7 +251,7 @@
           <a:p>
             <a:fld id="{5DCFF550-74A6-4A3B-803B-1468DFA707D9}" type="datetimeFigureOut">
               <a:rPr lang="hu-HU" smtClean="0"/>
-              <a:t>2022.09.08.</a:t>
+              <a:t>2022.09.12.</a:t>
             </a:fld>
             <a:endParaRPr lang="hu-HU"/>
           </a:p>
@@ -253,7 +259,7 @@
       </p:sp>
       <p:sp>
         <p:nvSpPr>
-          <p:cNvPr id="5" name="Élőláb helye 4"/>
+          <p:cNvPr id="5" name="Footer Placeholder 4"/>
           <p:cNvSpPr>
             <a:spLocks noGrp="1"/>
           </p:cNvSpPr>
@@ -272,7 +278,7 @@
       </p:sp>
       <p:sp>
         <p:nvSpPr>
-          <p:cNvPr id="6" name="Dia számának helye 5"/>
+          <p:cNvPr id="6" name="Slide Number Placeholder 5"/>
           <p:cNvSpPr>
             <a:spLocks noGrp="1"/>
           </p:cNvSpPr>
@@ -296,13 +302,25 @@
     </p:spTree>
     <p:extLst>
       <p:ext uri="{BB962C8B-B14F-4D97-AF65-F5344CB8AC3E}">
-        <p14:creationId xmlns:p14="http://schemas.microsoft.com/office/powerpoint/2010/main" val="1550096777"/>
+        <p14:creationId xmlns:p14="http://schemas.microsoft.com/office/powerpoint/2010/main" val="564711767"/>
       </p:ext>
     </p:extLst>
   </p:cSld>
   <p:clrMapOvr>
     <a:masterClrMapping/>
   </p:clrMapOvr>
+  <mc:AlternateContent xmlns:mc="http://schemas.openxmlformats.org/markup-compatibility/2006">
+    <mc:Choice xmlns:p14="http://schemas.microsoft.com/office/powerpoint/2010/main" Requires="p14">
+      <p:transition spd="slow" p14:dur="1500">
+        <p:push/>
+      </p:transition>
+    </mc:Choice>
+    <mc:Fallback>
+      <p:transition spd="slow">
+        <p:push/>
+      </p:transition>
+    </mc:Fallback>
+  </mc:AlternateContent>
 </p:sldLayout>
 </file>
 
@@ -325,7 +343,7 @@
       </p:grpSpPr>
       <p:sp>
         <p:nvSpPr>
-          <p:cNvPr id="2" name="Cím 1"/>
+          <p:cNvPr id="2" name="Title 1"/>
           <p:cNvSpPr>
             <a:spLocks noGrp="1"/>
           </p:cNvSpPr>
@@ -342,13 +360,13 @@
               <a:rPr lang="hu-HU" smtClean="0"/>
               <a:t>Mintacím szerkesztése</a:t>
             </a:r>
-            <a:endParaRPr lang="hu-HU"/>
-          </a:p>
-        </p:txBody>
-      </p:sp>
-      <p:sp>
-        <p:nvSpPr>
-          <p:cNvPr id="3" name="Függőleges szöveg helye 2"/>
+            <a:endParaRPr lang="en-US" dirty="0"/>
+          </a:p>
+        </p:txBody>
+      </p:sp>
+      <p:sp>
+        <p:nvSpPr>
+          <p:cNvPr id="3" name="Vertical Text Placeholder 2"/>
           <p:cNvSpPr>
             <a:spLocks noGrp="1"/>
           </p:cNvSpPr>
@@ -394,13 +412,13 @@
               <a:rPr lang="hu-HU" smtClean="0"/>
               <a:t>Ötödik szint</a:t>
             </a:r>
-            <a:endParaRPr lang="hu-HU"/>
-          </a:p>
-        </p:txBody>
-      </p:sp>
-      <p:sp>
-        <p:nvSpPr>
-          <p:cNvPr id="4" name="Dátum helye 3"/>
+            <a:endParaRPr lang="en-US" dirty="0"/>
+          </a:p>
+        </p:txBody>
+      </p:sp>
+      <p:sp>
+        <p:nvSpPr>
+          <p:cNvPr id="4" name="Date Placeholder 3"/>
           <p:cNvSpPr>
             <a:spLocks noGrp="1"/>
           </p:cNvSpPr>
@@ -415,7 +433,7 @@
           <a:p>
             <a:fld id="{5DCFF550-74A6-4A3B-803B-1468DFA707D9}" type="datetimeFigureOut">
               <a:rPr lang="hu-HU" smtClean="0"/>
-              <a:t>2022.09.08.</a:t>
+              <a:t>2022.09.12.</a:t>
             </a:fld>
             <a:endParaRPr lang="hu-HU"/>
           </a:p>
@@ -423,7 +441,7 @@
       </p:sp>
       <p:sp>
         <p:nvSpPr>
-          <p:cNvPr id="5" name="Élőláb helye 4"/>
+          <p:cNvPr id="5" name="Footer Placeholder 4"/>
           <p:cNvSpPr>
             <a:spLocks noGrp="1"/>
           </p:cNvSpPr>
@@ -442,7 +460,7 @@
       </p:sp>
       <p:sp>
         <p:nvSpPr>
-          <p:cNvPr id="6" name="Dia számának helye 5"/>
+          <p:cNvPr id="6" name="Slide Number Placeholder 5"/>
           <p:cNvSpPr>
             <a:spLocks noGrp="1"/>
           </p:cNvSpPr>
@@ -466,13 +484,25 @@
     </p:spTree>
     <p:extLst>
       <p:ext uri="{BB962C8B-B14F-4D97-AF65-F5344CB8AC3E}">
-        <p14:creationId xmlns:p14="http://schemas.microsoft.com/office/powerpoint/2010/main" val="2502648369"/>
+        <p14:creationId xmlns:p14="http://schemas.microsoft.com/office/powerpoint/2010/main" val="3934635410"/>
       </p:ext>
     </p:extLst>
   </p:cSld>
   <p:clrMapOvr>
     <a:masterClrMapping/>
   </p:clrMapOvr>
+  <mc:AlternateContent xmlns:mc="http://schemas.openxmlformats.org/markup-compatibility/2006">
+    <mc:Choice xmlns:p14="http://schemas.microsoft.com/office/powerpoint/2010/main" Requires="p14">
+      <p:transition spd="slow" p14:dur="1500">
+        <p:push/>
+      </p:transition>
+    </mc:Choice>
+    <mc:Fallback>
+      <p:transition spd="slow">
+        <p:push/>
+      </p:transition>
+    </mc:Fallback>
+  </mc:AlternateContent>
 </p:sldLayout>
 </file>
 
@@ -495,7 +525,7 @@
       </p:grpSpPr>
       <p:sp>
         <p:nvSpPr>
-          <p:cNvPr id="2" name="Függőleges cím 1"/>
+          <p:cNvPr id="2" name="Vertical Title 1"/>
           <p:cNvSpPr>
             <a:spLocks noGrp="1"/>
           </p:cNvSpPr>
@@ -517,13 +547,13 @@
               <a:rPr lang="hu-HU" smtClean="0"/>
               <a:t>Mintacím szerkesztése</a:t>
             </a:r>
-            <a:endParaRPr lang="hu-HU"/>
-          </a:p>
-        </p:txBody>
-      </p:sp>
-      <p:sp>
-        <p:nvSpPr>
-          <p:cNvPr id="3" name="Függőleges szöveg helye 2"/>
+            <a:endParaRPr lang="en-US" dirty="0"/>
+          </a:p>
+        </p:txBody>
+      </p:sp>
+      <p:sp>
+        <p:nvSpPr>
+          <p:cNvPr id="3" name="Vertical Text Placeholder 2"/>
           <p:cNvSpPr>
             <a:spLocks noGrp="1"/>
           </p:cNvSpPr>
@@ -574,13 +604,13 @@
               <a:rPr lang="hu-HU" smtClean="0"/>
               <a:t>Ötödik szint</a:t>
             </a:r>
-            <a:endParaRPr lang="hu-HU"/>
-          </a:p>
-        </p:txBody>
-      </p:sp>
-      <p:sp>
-        <p:nvSpPr>
-          <p:cNvPr id="4" name="Dátum helye 3"/>
+            <a:endParaRPr lang="en-US" dirty="0"/>
+          </a:p>
+        </p:txBody>
+      </p:sp>
+      <p:sp>
+        <p:nvSpPr>
+          <p:cNvPr id="4" name="Date Placeholder 3"/>
           <p:cNvSpPr>
             <a:spLocks noGrp="1"/>
           </p:cNvSpPr>
@@ -595,7 +625,7 @@
           <a:p>
             <a:fld id="{5DCFF550-74A6-4A3B-803B-1468DFA707D9}" type="datetimeFigureOut">
               <a:rPr lang="hu-HU" smtClean="0"/>
-              <a:t>2022.09.08.</a:t>
+              <a:t>2022.09.12.</a:t>
             </a:fld>
             <a:endParaRPr lang="hu-HU"/>
           </a:p>
@@ -603,7 +633,7 @@
       </p:sp>
       <p:sp>
         <p:nvSpPr>
-          <p:cNvPr id="5" name="Élőláb helye 4"/>
+          <p:cNvPr id="5" name="Footer Placeholder 4"/>
           <p:cNvSpPr>
             <a:spLocks noGrp="1"/>
           </p:cNvSpPr>
@@ -622,7 +652,7 @@
       </p:sp>
       <p:sp>
         <p:nvSpPr>
-          <p:cNvPr id="6" name="Dia számának helye 5"/>
+          <p:cNvPr id="6" name="Slide Number Placeholder 5"/>
           <p:cNvSpPr>
             <a:spLocks noGrp="1"/>
           </p:cNvSpPr>
@@ -646,13 +676,25 @@
     </p:spTree>
     <p:extLst>
       <p:ext uri="{BB962C8B-B14F-4D97-AF65-F5344CB8AC3E}">
-        <p14:creationId xmlns:p14="http://schemas.microsoft.com/office/powerpoint/2010/main" val="1687489846"/>
+        <p14:creationId xmlns:p14="http://schemas.microsoft.com/office/powerpoint/2010/main" val="1875696432"/>
       </p:ext>
     </p:extLst>
   </p:cSld>
   <p:clrMapOvr>
     <a:masterClrMapping/>
   </p:clrMapOvr>
+  <mc:AlternateContent xmlns:mc="http://schemas.openxmlformats.org/markup-compatibility/2006">
+    <mc:Choice xmlns:p14="http://schemas.microsoft.com/office/powerpoint/2010/main" Requires="p14">
+      <p:transition spd="slow" p14:dur="1500">
+        <p:push/>
+      </p:transition>
+    </mc:Choice>
+    <mc:Fallback>
+      <p:transition spd="slow">
+        <p:push/>
+      </p:transition>
+    </mc:Fallback>
+  </mc:AlternateContent>
 </p:sldLayout>
 </file>
 
@@ -675,7 +717,7 @@
       </p:grpSpPr>
       <p:sp>
         <p:nvSpPr>
-          <p:cNvPr id="2" name="Cím 1"/>
+          <p:cNvPr id="2" name="Title 1"/>
           <p:cNvSpPr>
             <a:spLocks noGrp="1"/>
           </p:cNvSpPr>
@@ -692,13 +734,13 @@
               <a:rPr lang="hu-HU" smtClean="0"/>
               <a:t>Mintacím szerkesztése</a:t>
             </a:r>
-            <a:endParaRPr lang="hu-HU"/>
-          </a:p>
-        </p:txBody>
-      </p:sp>
-      <p:sp>
-        <p:nvSpPr>
-          <p:cNvPr id="3" name="Tartalom helye 2"/>
+            <a:endParaRPr lang="en-US" dirty="0"/>
+          </a:p>
+        </p:txBody>
+      </p:sp>
+      <p:sp>
+        <p:nvSpPr>
+          <p:cNvPr id="3" name="Content Placeholder 2"/>
           <p:cNvSpPr>
             <a:spLocks noGrp="1"/>
           </p:cNvSpPr>
@@ -744,13 +786,13 @@
               <a:rPr lang="hu-HU" smtClean="0"/>
               <a:t>Ötödik szint</a:t>
             </a:r>
-            <a:endParaRPr lang="hu-HU"/>
-          </a:p>
-        </p:txBody>
-      </p:sp>
-      <p:sp>
-        <p:nvSpPr>
-          <p:cNvPr id="4" name="Dátum helye 3"/>
+            <a:endParaRPr lang="en-US" dirty="0"/>
+          </a:p>
+        </p:txBody>
+      </p:sp>
+      <p:sp>
+        <p:nvSpPr>
+          <p:cNvPr id="4" name="Date Placeholder 3"/>
           <p:cNvSpPr>
             <a:spLocks noGrp="1"/>
           </p:cNvSpPr>
@@ -765,7 +807,7 @@
           <a:p>
             <a:fld id="{5DCFF550-74A6-4A3B-803B-1468DFA707D9}" type="datetimeFigureOut">
               <a:rPr lang="hu-HU" smtClean="0"/>
-              <a:t>2022.09.08.</a:t>
+              <a:t>2022.09.12.</a:t>
             </a:fld>
             <a:endParaRPr lang="hu-HU"/>
           </a:p>
@@ -773,7 +815,7 @@
       </p:sp>
       <p:sp>
         <p:nvSpPr>
-          <p:cNvPr id="5" name="Élőláb helye 4"/>
+          <p:cNvPr id="5" name="Footer Placeholder 4"/>
           <p:cNvSpPr>
             <a:spLocks noGrp="1"/>
           </p:cNvSpPr>
@@ -792,7 +834,7 @@
       </p:sp>
       <p:sp>
         <p:nvSpPr>
-          <p:cNvPr id="6" name="Dia számának helye 5"/>
+          <p:cNvPr id="6" name="Slide Number Placeholder 5"/>
           <p:cNvSpPr>
             <a:spLocks noGrp="1"/>
           </p:cNvSpPr>
@@ -816,13 +858,25 @@
     </p:spTree>
     <p:extLst>
       <p:ext uri="{BB962C8B-B14F-4D97-AF65-F5344CB8AC3E}">
-        <p14:creationId xmlns:p14="http://schemas.microsoft.com/office/powerpoint/2010/main" val="4125162369"/>
+        <p14:creationId xmlns:p14="http://schemas.microsoft.com/office/powerpoint/2010/main" val="2001651792"/>
       </p:ext>
     </p:extLst>
   </p:cSld>
   <p:clrMapOvr>
     <a:masterClrMapping/>
   </p:clrMapOvr>
+  <mc:AlternateContent xmlns:mc="http://schemas.openxmlformats.org/markup-compatibility/2006">
+    <mc:Choice xmlns:p14="http://schemas.microsoft.com/office/powerpoint/2010/main" Requires="p14">
+      <p:transition spd="slow" p14:dur="1500">
+        <p:push/>
+      </p:transition>
+    </mc:Choice>
+    <mc:Fallback>
+      <p:transition spd="slow">
+        <p:push/>
+      </p:transition>
+    </mc:Fallback>
+  </mc:AlternateContent>
 </p:sldLayout>
 </file>
 
@@ -845,7 +899,7 @@
       </p:grpSpPr>
       <p:sp>
         <p:nvSpPr>
-          <p:cNvPr id="2" name="Cím 1"/>
+          <p:cNvPr id="2" name="Title 1"/>
           <p:cNvSpPr>
             <a:spLocks noGrp="1"/>
           </p:cNvSpPr>
@@ -871,13 +925,13 @@
               <a:rPr lang="hu-HU" smtClean="0"/>
               <a:t>Mintacím szerkesztése</a:t>
             </a:r>
-            <a:endParaRPr lang="hu-HU"/>
-          </a:p>
-        </p:txBody>
-      </p:sp>
-      <p:sp>
-        <p:nvSpPr>
-          <p:cNvPr id="3" name="Szöveg helye 2"/>
+            <a:endParaRPr lang="en-US" dirty="0"/>
+          </a:p>
+        </p:txBody>
+      </p:sp>
+      <p:sp>
+        <p:nvSpPr>
+          <p:cNvPr id="3" name="Text Placeholder 2"/>
           <p:cNvSpPr>
             <a:spLocks noGrp="1"/>
           </p:cNvSpPr>
@@ -996,7 +1050,7 @@
       </p:sp>
       <p:sp>
         <p:nvSpPr>
-          <p:cNvPr id="4" name="Dátum helye 3"/>
+          <p:cNvPr id="4" name="Date Placeholder 3"/>
           <p:cNvSpPr>
             <a:spLocks noGrp="1"/>
           </p:cNvSpPr>
@@ -1011,7 +1065,7 @@
           <a:p>
             <a:fld id="{5DCFF550-74A6-4A3B-803B-1468DFA707D9}" type="datetimeFigureOut">
               <a:rPr lang="hu-HU" smtClean="0"/>
-              <a:t>2022.09.08.</a:t>
+              <a:t>2022.09.12.</a:t>
             </a:fld>
             <a:endParaRPr lang="hu-HU"/>
           </a:p>
@@ -1019,7 +1073,7 @@
       </p:sp>
       <p:sp>
         <p:nvSpPr>
-          <p:cNvPr id="5" name="Élőláb helye 4"/>
+          <p:cNvPr id="5" name="Footer Placeholder 4"/>
           <p:cNvSpPr>
             <a:spLocks noGrp="1"/>
           </p:cNvSpPr>
@@ -1038,7 +1092,7 @@
       </p:sp>
       <p:sp>
         <p:nvSpPr>
-          <p:cNvPr id="6" name="Dia számának helye 5"/>
+          <p:cNvPr id="6" name="Slide Number Placeholder 5"/>
           <p:cNvSpPr>
             <a:spLocks noGrp="1"/>
           </p:cNvSpPr>
@@ -1062,13 +1116,25 @@
     </p:spTree>
     <p:extLst>
       <p:ext uri="{BB962C8B-B14F-4D97-AF65-F5344CB8AC3E}">
-        <p14:creationId xmlns:p14="http://schemas.microsoft.com/office/powerpoint/2010/main" val="2577190975"/>
+        <p14:creationId xmlns:p14="http://schemas.microsoft.com/office/powerpoint/2010/main" val="163230645"/>
       </p:ext>
     </p:extLst>
   </p:cSld>
   <p:clrMapOvr>
     <a:masterClrMapping/>
   </p:clrMapOvr>
+  <mc:AlternateContent xmlns:mc="http://schemas.openxmlformats.org/markup-compatibility/2006">
+    <mc:Choice xmlns:p14="http://schemas.microsoft.com/office/powerpoint/2010/main" Requires="p14">
+      <p:transition spd="slow" p14:dur="1500">
+        <p:push/>
+      </p:transition>
+    </mc:Choice>
+    <mc:Fallback>
+      <p:transition spd="slow">
+        <p:push/>
+      </p:transition>
+    </mc:Fallback>
+  </mc:AlternateContent>
 </p:sldLayout>
 </file>
 
@@ -1091,7 +1157,7 @@
       </p:grpSpPr>
       <p:sp>
         <p:nvSpPr>
-          <p:cNvPr id="2" name="Cím 1"/>
+          <p:cNvPr id="2" name="Title 1"/>
           <p:cNvSpPr>
             <a:spLocks noGrp="1"/>
           </p:cNvSpPr>
@@ -1108,13 +1174,13 @@
               <a:rPr lang="hu-HU" smtClean="0"/>
               <a:t>Mintacím szerkesztése</a:t>
             </a:r>
-            <a:endParaRPr lang="hu-HU"/>
-          </a:p>
-        </p:txBody>
-      </p:sp>
-      <p:sp>
-        <p:nvSpPr>
-          <p:cNvPr id="3" name="Tartalom helye 2"/>
+            <a:endParaRPr lang="en-US" dirty="0"/>
+          </a:p>
+        </p:txBody>
+      </p:sp>
+      <p:sp>
+        <p:nvSpPr>
+          <p:cNvPr id="3" name="Content Placeholder 2"/>
           <p:cNvSpPr>
             <a:spLocks noGrp="1"/>
           </p:cNvSpPr>
@@ -1165,13 +1231,13 @@
               <a:rPr lang="hu-HU" smtClean="0"/>
               <a:t>Ötödik szint</a:t>
             </a:r>
-            <a:endParaRPr lang="hu-HU"/>
-          </a:p>
-        </p:txBody>
-      </p:sp>
-      <p:sp>
-        <p:nvSpPr>
-          <p:cNvPr id="4" name="Tartalom helye 3"/>
+            <a:endParaRPr lang="en-US" dirty="0"/>
+          </a:p>
+        </p:txBody>
+      </p:sp>
+      <p:sp>
+        <p:nvSpPr>
+          <p:cNvPr id="4" name="Content Placeholder 3"/>
           <p:cNvSpPr>
             <a:spLocks noGrp="1"/>
           </p:cNvSpPr>
@@ -1222,13 +1288,13 @@
               <a:rPr lang="hu-HU" smtClean="0"/>
               <a:t>Ötödik szint</a:t>
             </a:r>
-            <a:endParaRPr lang="hu-HU"/>
-          </a:p>
-        </p:txBody>
-      </p:sp>
-      <p:sp>
-        <p:nvSpPr>
-          <p:cNvPr id="5" name="Dátum helye 4"/>
+            <a:endParaRPr lang="en-US" dirty="0"/>
+          </a:p>
+        </p:txBody>
+      </p:sp>
+      <p:sp>
+        <p:nvSpPr>
+          <p:cNvPr id="5" name="Date Placeholder 4"/>
           <p:cNvSpPr>
             <a:spLocks noGrp="1"/>
           </p:cNvSpPr>
@@ -1243,7 +1309,7 @@
           <a:p>
             <a:fld id="{5DCFF550-74A6-4A3B-803B-1468DFA707D9}" type="datetimeFigureOut">
               <a:rPr lang="hu-HU" smtClean="0"/>
-              <a:t>2022.09.08.</a:t>
+              <a:t>2022.09.12.</a:t>
             </a:fld>
             <a:endParaRPr lang="hu-HU"/>
           </a:p>
@@ -1251,7 +1317,7 @@
       </p:sp>
       <p:sp>
         <p:nvSpPr>
-          <p:cNvPr id="6" name="Élőláb helye 5"/>
+          <p:cNvPr id="6" name="Footer Placeholder 5"/>
           <p:cNvSpPr>
             <a:spLocks noGrp="1"/>
           </p:cNvSpPr>
@@ -1270,7 +1336,7 @@
       </p:sp>
       <p:sp>
         <p:nvSpPr>
-          <p:cNvPr id="7" name="Dia számának helye 6"/>
+          <p:cNvPr id="7" name="Slide Number Placeholder 6"/>
           <p:cNvSpPr>
             <a:spLocks noGrp="1"/>
           </p:cNvSpPr>
@@ -1294,13 +1360,25 @@
     </p:spTree>
     <p:extLst>
       <p:ext uri="{BB962C8B-B14F-4D97-AF65-F5344CB8AC3E}">
-        <p14:creationId xmlns:p14="http://schemas.microsoft.com/office/powerpoint/2010/main" val="1709654900"/>
+        <p14:creationId xmlns:p14="http://schemas.microsoft.com/office/powerpoint/2010/main" val="2046746241"/>
       </p:ext>
     </p:extLst>
   </p:cSld>
   <p:clrMapOvr>
     <a:masterClrMapping/>
   </p:clrMapOvr>
+  <mc:AlternateContent xmlns:mc="http://schemas.openxmlformats.org/markup-compatibility/2006">
+    <mc:Choice xmlns:p14="http://schemas.microsoft.com/office/powerpoint/2010/main" Requires="p14">
+      <p:transition spd="slow" p14:dur="1500">
+        <p:push/>
+      </p:transition>
+    </mc:Choice>
+    <mc:Fallback>
+      <p:transition spd="slow">
+        <p:push/>
+      </p:transition>
+    </mc:Fallback>
+  </mc:AlternateContent>
 </p:sldLayout>
 </file>
 
@@ -1323,7 +1401,7 @@
       </p:grpSpPr>
       <p:sp>
         <p:nvSpPr>
-          <p:cNvPr id="2" name="Cím 1"/>
+          <p:cNvPr id="2" name="Title 1"/>
           <p:cNvSpPr>
             <a:spLocks noGrp="1"/>
           </p:cNvSpPr>
@@ -1345,13 +1423,13 @@
               <a:rPr lang="hu-HU" smtClean="0"/>
               <a:t>Mintacím szerkesztése</a:t>
             </a:r>
-            <a:endParaRPr lang="hu-HU"/>
-          </a:p>
-        </p:txBody>
-      </p:sp>
-      <p:sp>
-        <p:nvSpPr>
-          <p:cNvPr id="3" name="Szöveg helye 2"/>
+            <a:endParaRPr lang="en-US" dirty="0"/>
+          </a:p>
+        </p:txBody>
+      </p:sp>
+      <p:sp>
+        <p:nvSpPr>
+          <p:cNvPr id="3" name="Text Placeholder 2"/>
           <p:cNvSpPr>
             <a:spLocks noGrp="1"/>
           </p:cNvSpPr>
@@ -1416,7 +1494,7 @@
       </p:sp>
       <p:sp>
         <p:nvSpPr>
-          <p:cNvPr id="4" name="Tartalom helye 3"/>
+          <p:cNvPr id="4" name="Content Placeholder 3"/>
           <p:cNvSpPr>
             <a:spLocks noGrp="1"/>
           </p:cNvSpPr>
@@ -1467,13 +1545,13 @@
               <a:rPr lang="hu-HU" smtClean="0"/>
               <a:t>Ötödik szint</a:t>
             </a:r>
-            <a:endParaRPr lang="hu-HU"/>
-          </a:p>
-        </p:txBody>
-      </p:sp>
-      <p:sp>
-        <p:nvSpPr>
-          <p:cNvPr id="5" name="Szöveg helye 4"/>
+            <a:endParaRPr lang="en-US" dirty="0"/>
+          </a:p>
+        </p:txBody>
+      </p:sp>
+      <p:sp>
+        <p:nvSpPr>
+          <p:cNvPr id="5" name="Text Placeholder 4"/>
           <p:cNvSpPr>
             <a:spLocks noGrp="1"/>
           </p:cNvSpPr>
@@ -1538,7 +1616,7 @@
       </p:sp>
       <p:sp>
         <p:nvSpPr>
-          <p:cNvPr id="6" name="Tartalom helye 5"/>
+          <p:cNvPr id="6" name="Content Placeholder 5"/>
           <p:cNvSpPr>
             <a:spLocks noGrp="1"/>
           </p:cNvSpPr>
@@ -1589,13 +1667,13 @@
               <a:rPr lang="hu-HU" smtClean="0"/>
               <a:t>Ötödik szint</a:t>
             </a:r>
-            <a:endParaRPr lang="hu-HU"/>
-          </a:p>
-        </p:txBody>
-      </p:sp>
-      <p:sp>
-        <p:nvSpPr>
-          <p:cNvPr id="7" name="Dátum helye 6"/>
+            <a:endParaRPr lang="en-US" dirty="0"/>
+          </a:p>
+        </p:txBody>
+      </p:sp>
+      <p:sp>
+        <p:nvSpPr>
+          <p:cNvPr id="7" name="Date Placeholder 6"/>
           <p:cNvSpPr>
             <a:spLocks noGrp="1"/>
           </p:cNvSpPr>
@@ -1610,7 +1688,7 @@
           <a:p>
             <a:fld id="{5DCFF550-74A6-4A3B-803B-1468DFA707D9}" type="datetimeFigureOut">
               <a:rPr lang="hu-HU" smtClean="0"/>
-              <a:t>2022.09.08.</a:t>
+              <a:t>2022.09.12.</a:t>
             </a:fld>
             <a:endParaRPr lang="hu-HU"/>
           </a:p>
@@ -1618,7 +1696,7 @@
       </p:sp>
       <p:sp>
         <p:nvSpPr>
-          <p:cNvPr id="8" name="Élőláb helye 7"/>
+          <p:cNvPr id="8" name="Footer Placeholder 7"/>
           <p:cNvSpPr>
             <a:spLocks noGrp="1"/>
           </p:cNvSpPr>
@@ -1637,7 +1715,7 @@
       </p:sp>
       <p:sp>
         <p:nvSpPr>
-          <p:cNvPr id="9" name="Dia számának helye 8"/>
+          <p:cNvPr id="9" name="Slide Number Placeholder 8"/>
           <p:cNvSpPr>
             <a:spLocks noGrp="1"/>
           </p:cNvSpPr>
@@ -1661,13 +1739,25 @@
     </p:spTree>
     <p:extLst>
       <p:ext uri="{BB962C8B-B14F-4D97-AF65-F5344CB8AC3E}">
-        <p14:creationId xmlns:p14="http://schemas.microsoft.com/office/powerpoint/2010/main" val="1773502070"/>
+        <p14:creationId xmlns:p14="http://schemas.microsoft.com/office/powerpoint/2010/main" val="2074093644"/>
       </p:ext>
     </p:extLst>
   </p:cSld>
   <p:clrMapOvr>
     <a:masterClrMapping/>
   </p:clrMapOvr>
+  <mc:AlternateContent xmlns:mc="http://schemas.openxmlformats.org/markup-compatibility/2006">
+    <mc:Choice xmlns:p14="http://schemas.microsoft.com/office/powerpoint/2010/main" Requires="p14">
+      <p:transition spd="slow" p14:dur="1500">
+        <p:push/>
+      </p:transition>
+    </mc:Choice>
+    <mc:Fallback>
+      <p:transition spd="slow">
+        <p:push/>
+      </p:transition>
+    </mc:Fallback>
+  </mc:AlternateContent>
 </p:sldLayout>
 </file>
 
@@ -1690,7 +1780,7 @@
       </p:grpSpPr>
       <p:sp>
         <p:nvSpPr>
-          <p:cNvPr id="2" name="Cím 1"/>
+          <p:cNvPr id="2" name="Title 1"/>
           <p:cNvSpPr>
             <a:spLocks noGrp="1"/>
           </p:cNvSpPr>
@@ -1707,13 +1797,13 @@
               <a:rPr lang="hu-HU" smtClean="0"/>
               <a:t>Mintacím szerkesztése</a:t>
             </a:r>
-            <a:endParaRPr lang="hu-HU"/>
-          </a:p>
-        </p:txBody>
-      </p:sp>
-      <p:sp>
-        <p:nvSpPr>
-          <p:cNvPr id="3" name="Dátum helye 2"/>
+            <a:endParaRPr lang="en-US" dirty="0"/>
+          </a:p>
+        </p:txBody>
+      </p:sp>
+      <p:sp>
+        <p:nvSpPr>
+          <p:cNvPr id="3" name="Date Placeholder 2"/>
           <p:cNvSpPr>
             <a:spLocks noGrp="1"/>
           </p:cNvSpPr>
@@ -1728,7 +1818,7 @@
           <a:p>
             <a:fld id="{5DCFF550-74A6-4A3B-803B-1468DFA707D9}" type="datetimeFigureOut">
               <a:rPr lang="hu-HU" smtClean="0"/>
-              <a:t>2022.09.08.</a:t>
+              <a:t>2022.09.12.</a:t>
             </a:fld>
             <a:endParaRPr lang="hu-HU"/>
           </a:p>
@@ -1736,7 +1826,7 @@
       </p:sp>
       <p:sp>
         <p:nvSpPr>
-          <p:cNvPr id="4" name="Élőláb helye 3"/>
+          <p:cNvPr id="4" name="Footer Placeholder 3"/>
           <p:cNvSpPr>
             <a:spLocks noGrp="1"/>
           </p:cNvSpPr>
@@ -1755,7 +1845,7 @@
       </p:sp>
       <p:sp>
         <p:nvSpPr>
-          <p:cNvPr id="5" name="Dia számának helye 4"/>
+          <p:cNvPr id="5" name="Slide Number Placeholder 4"/>
           <p:cNvSpPr>
             <a:spLocks noGrp="1"/>
           </p:cNvSpPr>
@@ -1779,13 +1869,25 @@
     </p:spTree>
     <p:extLst>
       <p:ext uri="{BB962C8B-B14F-4D97-AF65-F5344CB8AC3E}">
-        <p14:creationId xmlns:p14="http://schemas.microsoft.com/office/powerpoint/2010/main" val="1119086653"/>
+        <p14:creationId xmlns:p14="http://schemas.microsoft.com/office/powerpoint/2010/main" val="1966598100"/>
       </p:ext>
     </p:extLst>
   </p:cSld>
   <p:clrMapOvr>
     <a:masterClrMapping/>
   </p:clrMapOvr>
+  <mc:AlternateContent xmlns:mc="http://schemas.openxmlformats.org/markup-compatibility/2006">
+    <mc:Choice xmlns:p14="http://schemas.microsoft.com/office/powerpoint/2010/main" Requires="p14">
+      <p:transition spd="slow" p14:dur="1500">
+        <p:push/>
+      </p:transition>
+    </mc:Choice>
+    <mc:Fallback>
+      <p:transition spd="slow">
+        <p:push/>
+      </p:transition>
+    </mc:Fallback>
+  </mc:AlternateContent>
 </p:sldLayout>
 </file>
 
@@ -1808,7 +1910,7 @@
       </p:grpSpPr>
       <p:sp>
         <p:nvSpPr>
-          <p:cNvPr id="2" name="Dátum helye 1"/>
+          <p:cNvPr id="2" name="Date Placeholder 1"/>
           <p:cNvSpPr>
             <a:spLocks noGrp="1"/>
           </p:cNvSpPr>
@@ -1823,7 +1925,7 @@
           <a:p>
             <a:fld id="{5DCFF550-74A6-4A3B-803B-1468DFA707D9}" type="datetimeFigureOut">
               <a:rPr lang="hu-HU" smtClean="0"/>
-              <a:t>2022.09.08.</a:t>
+              <a:t>2022.09.12.</a:t>
             </a:fld>
             <a:endParaRPr lang="hu-HU"/>
           </a:p>
@@ -1831,7 +1933,7 @@
       </p:sp>
       <p:sp>
         <p:nvSpPr>
-          <p:cNvPr id="3" name="Élőláb helye 2"/>
+          <p:cNvPr id="3" name="Footer Placeholder 2"/>
           <p:cNvSpPr>
             <a:spLocks noGrp="1"/>
           </p:cNvSpPr>
@@ -1850,7 +1952,7 @@
       </p:sp>
       <p:sp>
         <p:nvSpPr>
-          <p:cNvPr id="4" name="Dia számának helye 3"/>
+          <p:cNvPr id="4" name="Slide Number Placeholder 3"/>
           <p:cNvSpPr>
             <a:spLocks noGrp="1"/>
           </p:cNvSpPr>
@@ -1874,13 +1976,25 @@
     </p:spTree>
     <p:extLst>
       <p:ext uri="{BB962C8B-B14F-4D97-AF65-F5344CB8AC3E}">
-        <p14:creationId xmlns:p14="http://schemas.microsoft.com/office/powerpoint/2010/main" val="2410636247"/>
+        <p14:creationId xmlns:p14="http://schemas.microsoft.com/office/powerpoint/2010/main" val="1791110934"/>
       </p:ext>
     </p:extLst>
   </p:cSld>
   <p:clrMapOvr>
     <a:masterClrMapping/>
   </p:clrMapOvr>
+  <mc:AlternateContent xmlns:mc="http://schemas.openxmlformats.org/markup-compatibility/2006">
+    <mc:Choice xmlns:p14="http://schemas.microsoft.com/office/powerpoint/2010/main" Requires="p14">
+      <p:transition spd="slow" p14:dur="1500">
+        <p:push/>
+      </p:transition>
+    </mc:Choice>
+    <mc:Fallback>
+      <p:transition spd="slow">
+        <p:push/>
+      </p:transition>
+    </mc:Fallback>
+  </mc:AlternateContent>
 </p:sldLayout>
 </file>
 
@@ -1903,7 +2017,7 @@
       </p:grpSpPr>
       <p:sp>
         <p:nvSpPr>
-          <p:cNvPr id="2" name="Cím 1"/>
+          <p:cNvPr id="2" name="Title 1"/>
           <p:cNvSpPr>
             <a:spLocks noGrp="1"/>
           </p:cNvSpPr>
@@ -1929,13 +2043,13 @@
               <a:rPr lang="hu-HU" smtClean="0"/>
               <a:t>Mintacím szerkesztése</a:t>
             </a:r>
-            <a:endParaRPr lang="hu-HU"/>
-          </a:p>
-        </p:txBody>
-      </p:sp>
-      <p:sp>
-        <p:nvSpPr>
-          <p:cNvPr id="3" name="Tartalom helye 2"/>
+            <a:endParaRPr lang="en-US" dirty="0"/>
+          </a:p>
+        </p:txBody>
+      </p:sp>
+      <p:sp>
+        <p:nvSpPr>
+          <p:cNvPr id="3" name="Content Placeholder 2"/>
           <p:cNvSpPr>
             <a:spLocks noGrp="1"/>
           </p:cNvSpPr>
@@ -2014,13 +2128,13 @@
               <a:rPr lang="hu-HU" smtClean="0"/>
               <a:t>Ötödik szint</a:t>
             </a:r>
-            <a:endParaRPr lang="hu-HU"/>
-          </a:p>
-        </p:txBody>
-      </p:sp>
-      <p:sp>
-        <p:nvSpPr>
-          <p:cNvPr id="4" name="Szöveg helye 3"/>
+            <a:endParaRPr lang="en-US" dirty="0"/>
+          </a:p>
+        </p:txBody>
+      </p:sp>
+      <p:sp>
+        <p:nvSpPr>
+          <p:cNvPr id="4" name="Text Placeholder 3"/>
           <p:cNvSpPr>
             <a:spLocks noGrp="1"/>
           </p:cNvSpPr>
@@ -2085,7 +2199,7 @@
       </p:sp>
       <p:sp>
         <p:nvSpPr>
-          <p:cNvPr id="5" name="Dátum helye 4"/>
+          <p:cNvPr id="5" name="Date Placeholder 4"/>
           <p:cNvSpPr>
             <a:spLocks noGrp="1"/>
           </p:cNvSpPr>
@@ -2100,7 +2214,7 @@
           <a:p>
             <a:fld id="{5DCFF550-74A6-4A3B-803B-1468DFA707D9}" type="datetimeFigureOut">
               <a:rPr lang="hu-HU" smtClean="0"/>
-              <a:t>2022.09.08.</a:t>
+              <a:t>2022.09.12.</a:t>
             </a:fld>
             <a:endParaRPr lang="hu-HU"/>
           </a:p>
@@ -2108,7 +2222,7 @@
       </p:sp>
       <p:sp>
         <p:nvSpPr>
-          <p:cNvPr id="6" name="Élőláb helye 5"/>
+          <p:cNvPr id="6" name="Footer Placeholder 5"/>
           <p:cNvSpPr>
             <a:spLocks noGrp="1"/>
           </p:cNvSpPr>
@@ -2127,7 +2241,7 @@
       </p:sp>
       <p:sp>
         <p:nvSpPr>
-          <p:cNvPr id="7" name="Dia számának helye 6"/>
+          <p:cNvPr id="7" name="Slide Number Placeholder 6"/>
           <p:cNvSpPr>
             <a:spLocks noGrp="1"/>
           </p:cNvSpPr>
@@ -2151,13 +2265,25 @@
     </p:spTree>
     <p:extLst>
       <p:ext uri="{BB962C8B-B14F-4D97-AF65-F5344CB8AC3E}">
-        <p14:creationId xmlns:p14="http://schemas.microsoft.com/office/powerpoint/2010/main" val="1939991602"/>
+        <p14:creationId xmlns:p14="http://schemas.microsoft.com/office/powerpoint/2010/main" val="706741003"/>
       </p:ext>
     </p:extLst>
   </p:cSld>
   <p:clrMapOvr>
     <a:masterClrMapping/>
   </p:clrMapOvr>
+  <mc:AlternateContent xmlns:mc="http://schemas.openxmlformats.org/markup-compatibility/2006">
+    <mc:Choice xmlns:p14="http://schemas.microsoft.com/office/powerpoint/2010/main" Requires="p14">
+      <p:transition spd="slow" p14:dur="1500">
+        <p:push/>
+      </p:transition>
+    </mc:Choice>
+    <mc:Fallback>
+      <p:transition spd="slow">
+        <p:push/>
+      </p:transition>
+    </mc:Fallback>
+  </mc:AlternateContent>
 </p:sldLayout>
 </file>
 
@@ -2180,7 +2306,7 @@
       </p:grpSpPr>
       <p:sp>
         <p:nvSpPr>
-          <p:cNvPr id="2" name="Cím 1"/>
+          <p:cNvPr id="2" name="Title 1"/>
           <p:cNvSpPr>
             <a:spLocks noGrp="1"/>
           </p:cNvSpPr>
@@ -2206,15 +2332,15 @@
               <a:rPr lang="hu-HU" smtClean="0"/>
               <a:t>Mintacím szerkesztése</a:t>
             </a:r>
-            <a:endParaRPr lang="hu-HU"/>
-          </a:p>
-        </p:txBody>
-      </p:sp>
-      <p:sp>
-        <p:nvSpPr>
-          <p:cNvPr id="3" name="Kép helye 2"/>
-          <p:cNvSpPr>
-            <a:spLocks noGrp="1"/>
+            <a:endParaRPr lang="en-US" dirty="0"/>
+          </a:p>
+        </p:txBody>
+      </p:sp>
+      <p:sp>
+        <p:nvSpPr>
+          <p:cNvPr id="3" name="Picture Placeholder 2"/>
+          <p:cNvSpPr>
+            <a:spLocks noGrp="1" noChangeAspect="1"/>
           </p:cNvSpPr>
           <p:nvPr>
             <p:ph type="pic" idx="1"/>
@@ -2227,7 +2353,7 @@
           </a:xfrm>
         </p:spPr>
         <p:txBody>
-          <a:bodyPr/>
+          <a:bodyPr anchor="t"/>
           <a:lstStyle>
             <a:lvl1pPr marL="0" indent="0">
               <a:buNone/>
@@ -2267,13 +2393,17 @@
             </a:lvl9pPr>
           </a:lstStyle>
           <a:p>
-            <a:endParaRPr lang="hu-HU"/>
-          </a:p>
-        </p:txBody>
-      </p:sp>
-      <p:sp>
-        <p:nvSpPr>
-          <p:cNvPr id="4" name="Szöveg helye 3"/>
+            <a:r>
+              <a:rPr lang="hu-HU" smtClean="0"/>
+              <a:t>Kép beszúrásához kattintson az ikonra</a:t>
+            </a:r>
+            <a:endParaRPr lang="en-US" dirty="0"/>
+          </a:p>
+        </p:txBody>
+      </p:sp>
+      <p:sp>
+        <p:nvSpPr>
+          <p:cNvPr id="4" name="Text Placeholder 3"/>
           <p:cNvSpPr>
             <a:spLocks noGrp="1"/>
           </p:cNvSpPr>
@@ -2338,7 +2468,7 @@
       </p:sp>
       <p:sp>
         <p:nvSpPr>
-          <p:cNvPr id="5" name="Dátum helye 4"/>
+          <p:cNvPr id="5" name="Date Placeholder 4"/>
           <p:cNvSpPr>
             <a:spLocks noGrp="1"/>
           </p:cNvSpPr>
@@ -2353,7 +2483,7 @@
           <a:p>
             <a:fld id="{5DCFF550-74A6-4A3B-803B-1468DFA707D9}" type="datetimeFigureOut">
               <a:rPr lang="hu-HU" smtClean="0"/>
-              <a:t>2022.09.08.</a:t>
+              <a:t>2022.09.12.</a:t>
             </a:fld>
             <a:endParaRPr lang="hu-HU"/>
           </a:p>
@@ -2361,7 +2491,7 @@
       </p:sp>
       <p:sp>
         <p:nvSpPr>
-          <p:cNvPr id="6" name="Élőláb helye 5"/>
+          <p:cNvPr id="6" name="Footer Placeholder 5"/>
           <p:cNvSpPr>
             <a:spLocks noGrp="1"/>
           </p:cNvSpPr>
@@ -2380,7 +2510,7 @@
       </p:sp>
       <p:sp>
         <p:nvSpPr>
-          <p:cNvPr id="7" name="Dia számának helye 6"/>
+          <p:cNvPr id="7" name="Slide Number Placeholder 6"/>
           <p:cNvSpPr>
             <a:spLocks noGrp="1"/>
           </p:cNvSpPr>
@@ -2404,13 +2534,25 @@
     </p:spTree>
     <p:extLst>
       <p:ext uri="{BB962C8B-B14F-4D97-AF65-F5344CB8AC3E}">
-        <p14:creationId xmlns:p14="http://schemas.microsoft.com/office/powerpoint/2010/main" val="2527639508"/>
+        <p14:creationId xmlns:p14="http://schemas.microsoft.com/office/powerpoint/2010/main" val="3313713189"/>
       </p:ext>
     </p:extLst>
   </p:cSld>
   <p:clrMapOvr>
     <a:masterClrMapping/>
   </p:clrMapOvr>
+  <mc:AlternateContent xmlns:mc="http://schemas.openxmlformats.org/markup-compatibility/2006">
+    <mc:Choice xmlns:p14="http://schemas.microsoft.com/office/powerpoint/2010/main" Requires="p14">
+      <p:transition spd="slow" p14:dur="1500">
+        <p:push/>
+      </p:transition>
+    </mc:Choice>
+    <mc:Fallback>
+      <p:transition spd="slow">
+        <p:push/>
+      </p:transition>
+    </mc:Fallback>
+  </mc:AlternateContent>
 </p:sldLayout>
 </file>
 
@@ -2438,7 +2580,7 @@
       </p:grpSpPr>
       <p:sp>
         <p:nvSpPr>
-          <p:cNvPr id="2" name="Cím helye 1"/>
+          <p:cNvPr id="2" name="Title Placeholder 1"/>
           <p:cNvSpPr>
             <a:spLocks noGrp="1"/>
           </p:cNvSpPr>
@@ -2465,13 +2607,13 @@
               <a:rPr lang="hu-HU" smtClean="0"/>
               <a:t>Mintacím szerkesztése</a:t>
             </a:r>
-            <a:endParaRPr lang="hu-HU"/>
-          </a:p>
-        </p:txBody>
-      </p:sp>
-      <p:sp>
-        <p:nvSpPr>
-          <p:cNvPr id="3" name="Szöveg helye 2"/>
+            <a:endParaRPr lang="en-US" dirty="0"/>
+          </a:p>
+        </p:txBody>
+      </p:sp>
+      <p:sp>
+        <p:nvSpPr>
+          <p:cNvPr id="3" name="Text Placeholder 2"/>
           <p:cNvSpPr>
             <a:spLocks noGrp="1"/>
           </p:cNvSpPr>
@@ -2527,13 +2669,13 @@
               <a:rPr lang="hu-HU" smtClean="0"/>
               <a:t>Ötödik szint</a:t>
             </a:r>
-            <a:endParaRPr lang="hu-HU"/>
-          </a:p>
-        </p:txBody>
-      </p:sp>
-      <p:sp>
-        <p:nvSpPr>
-          <p:cNvPr id="4" name="Dátum helye 3"/>
+            <a:endParaRPr lang="en-US" dirty="0"/>
+          </a:p>
+        </p:txBody>
+      </p:sp>
+      <p:sp>
+        <p:nvSpPr>
+          <p:cNvPr id="4" name="Date Placeholder 3"/>
           <p:cNvSpPr>
             <a:spLocks noGrp="1"/>
           </p:cNvSpPr>
@@ -2566,7 +2708,7 @@
           <a:p>
             <a:fld id="{5DCFF550-74A6-4A3B-803B-1468DFA707D9}" type="datetimeFigureOut">
               <a:rPr lang="hu-HU" smtClean="0"/>
-              <a:t>2022.09.08.</a:t>
+              <a:t>2022.09.12.</a:t>
             </a:fld>
             <a:endParaRPr lang="hu-HU"/>
           </a:p>
@@ -2574,7 +2716,7 @@
       </p:sp>
       <p:sp>
         <p:nvSpPr>
-          <p:cNvPr id="5" name="Élőláb helye 4"/>
+          <p:cNvPr id="5" name="Footer Placeholder 4"/>
           <p:cNvSpPr>
             <a:spLocks noGrp="1"/>
           </p:cNvSpPr>
@@ -2611,7 +2753,7 @@
       </p:sp>
       <p:sp>
         <p:nvSpPr>
-          <p:cNvPr id="6" name="Dia számának helye 5"/>
+          <p:cNvPr id="6" name="Slide Number Placeholder 5"/>
           <p:cNvSpPr>
             <a:spLocks noGrp="1"/>
           </p:cNvSpPr>
@@ -2653,24 +2795,36 @@
     </p:spTree>
     <p:extLst>
       <p:ext uri="{BB962C8B-B14F-4D97-AF65-F5344CB8AC3E}">
-        <p14:creationId xmlns:p14="http://schemas.microsoft.com/office/powerpoint/2010/main" val="4222589574"/>
+        <p14:creationId xmlns:p14="http://schemas.microsoft.com/office/powerpoint/2010/main" val="232297898"/>
       </p:ext>
     </p:extLst>
   </p:cSld>
   <p:clrMap bg1="lt1" tx1="dk1" bg2="lt2" tx2="dk2" accent1="accent1" accent2="accent2" accent3="accent3" accent4="accent4" accent5="accent5" accent6="accent6" hlink="hlink" folHlink="folHlink"/>
   <p:sldLayoutIdLst>
-    <p:sldLayoutId id="2147483649" r:id="rId1"/>
-    <p:sldLayoutId id="2147483650" r:id="rId2"/>
-    <p:sldLayoutId id="2147483651" r:id="rId3"/>
-    <p:sldLayoutId id="2147483652" r:id="rId4"/>
-    <p:sldLayoutId id="2147483653" r:id="rId5"/>
-    <p:sldLayoutId id="2147483654" r:id="rId6"/>
-    <p:sldLayoutId id="2147483655" r:id="rId7"/>
-    <p:sldLayoutId id="2147483656" r:id="rId8"/>
-    <p:sldLayoutId id="2147483657" r:id="rId9"/>
-    <p:sldLayoutId id="2147483658" r:id="rId10"/>
-    <p:sldLayoutId id="2147483659" r:id="rId11"/>
+    <p:sldLayoutId id="2147483673" r:id="rId1"/>
+    <p:sldLayoutId id="2147483674" r:id="rId2"/>
+    <p:sldLayoutId id="2147483675" r:id="rId3"/>
+    <p:sldLayoutId id="2147483676" r:id="rId4"/>
+    <p:sldLayoutId id="2147483677" r:id="rId5"/>
+    <p:sldLayoutId id="2147483678" r:id="rId6"/>
+    <p:sldLayoutId id="2147483679" r:id="rId7"/>
+    <p:sldLayoutId id="2147483680" r:id="rId8"/>
+    <p:sldLayoutId id="2147483681" r:id="rId9"/>
+    <p:sldLayoutId id="2147483682" r:id="rId10"/>
+    <p:sldLayoutId id="2147483683" r:id="rId11"/>
   </p:sldLayoutIdLst>
+  <mc:AlternateContent xmlns:mc="http://schemas.openxmlformats.org/markup-compatibility/2006">
+    <mc:Choice xmlns:p14="http://schemas.microsoft.com/office/powerpoint/2010/main" Requires="p14">
+      <p:transition spd="slow" p14:dur="1500">
+        <p:push/>
+      </p:transition>
+    </mc:Choice>
+    <mc:Fallback>
+      <p:transition spd="slow">
+        <p:push/>
+      </p:transition>
+    </mc:Fallback>
+  </mc:AlternateContent>
   <p:txStyles>
     <p:titleStyle>
       <a:lvl1pPr algn="l" defTabSz="914400" rtl="0" eaLnBrk="1" latinLnBrk="0" hangingPunct="1">
@@ -2857,7 +3011,7 @@
     </p:bodyStyle>
     <p:otherStyle>
       <a:defPPr>
-        <a:defRPr lang="hu-HU"/>
+        <a:defRPr lang="en-US"/>
       </a:defPPr>
       <a:lvl1pPr marL="0" algn="l" defTabSz="914400" rtl="0" eaLnBrk="1" latinLnBrk="0" hangingPunct="1">
         <a:defRPr sz="1800" kern="1200">
@@ -2986,7 +3140,11 @@
           <a:bodyPr/>
           <a:lstStyle/>
           <a:p>
-            <a:endParaRPr lang="hu-HU"/>
+            <a:r>
+              <a:rPr lang="hu-HU" dirty="0" smtClean="0"/>
+              <a:t>Adobe</a:t>
+            </a:r>
+            <a:endParaRPr lang="hu-HU" dirty="0"/>
           </a:p>
         </p:txBody>
       </p:sp>
@@ -3005,6 +3163,56 @@
           <a:bodyPr/>
           <a:lstStyle/>
           <a:p>
+            <a:r>
+              <a:rPr lang="hu-HU" dirty="0"/>
+              <a:t>https://www.adobe.com/hu/products/catalog.html</a:t>
+            </a:r>
+            <a:endParaRPr lang="hu-HU" dirty="0"/>
+          </a:p>
+        </p:txBody>
+      </p:sp>
+      <p:sp>
+        <p:nvSpPr>
+          <p:cNvPr id="4" name="Téglalap 3"/>
+          <p:cNvSpPr/>
+          <p:nvPr/>
+        </p:nvSpPr>
+        <p:spPr>
+          <a:xfrm>
+            <a:off x="0" y="4241800"/>
+            <a:ext cx="12192000" cy="114300"/>
+          </a:xfrm>
+          <a:prstGeom prst="rect">
+            <a:avLst/>
+          </a:prstGeom>
+          <a:solidFill>
+            <a:schemeClr val="tx1"/>
+          </a:solidFill>
+          <a:ln>
+            <a:noFill/>
+          </a:ln>
+        </p:spPr>
+        <p:style>
+          <a:lnRef idx="2">
+            <a:schemeClr val="accent1">
+              <a:shade val="50000"/>
+            </a:schemeClr>
+          </a:lnRef>
+          <a:fillRef idx="1">
+            <a:schemeClr val="accent1"/>
+          </a:fillRef>
+          <a:effectRef idx="0">
+            <a:schemeClr val="accent1"/>
+          </a:effectRef>
+          <a:fontRef idx="minor">
+            <a:schemeClr val="lt1"/>
+          </a:fontRef>
+        </p:style>
+        <p:txBody>
+          <a:bodyPr rtlCol="0" anchor="ctr"/>
+          <a:lstStyle/>
+          <a:p>
+            <a:pPr algn="ctr"/>
             <a:endParaRPr lang="hu-HU"/>
           </a:p>
         </p:txBody>
@@ -3019,6 +3227,14 @@
   <p:clrMapOvr>
     <a:masterClrMapping/>
   </p:clrMapOvr>
+  <mc:AlternateContent xmlns:mc="http://schemas.openxmlformats.org/markup-compatibility/2006">
+    <mc:Choice xmlns:p14="http://schemas.microsoft.com/office/powerpoint/2010/main" Requires="p14">
+      <p:transition p14:dur="0"/>
+    </mc:Choice>
+    <mc:Fallback>
+      <p:transition/>
+    </mc:Fallback>
+  </mc:AlternateContent>
   <p:timing>
     <p:tnLst>
       <p:par>
@@ -3054,15 +3270,18 @@
         </p:nvSpPr>
         <p:spPr>
           <a:xfrm>
-            <a:off x="0" y="4114800"/>
-            <a:ext cx="12192000" cy="723900"/>
+            <a:off x="0" y="4241800"/>
+            <a:ext cx="12192000" cy="114300"/>
           </a:xfrm>
           <a:prstGeom prst="rect">
             <a:avLst/>
           </a:prstGeom>
           <a:solidFill>
-            <a:srgbClr val="00B050"/>
+            <a:srgbClr val="31A8FF"/>
           </a:solidFill>
+          <a:ln>
+            <a:noFill/>
+          </a:ln>
         </p:spPr>
         <p:style>
           <a:lnRef idx="2">
@@ -3091,47 +3310,66 @@
       </p:sp>
       <p:sp>
         <p:nvSpPr>
-          <p:cNvPr id="8" name="Ellipszis 7"/>
-          <p:cNvSpPr/>
+          <p:cNvPr id="7" name="Szövegdoboz 6"/>
+          <p:cNvSpPr txBox="1"/>
           <p:nvPr/>
         </p:nvSpPr>
         <p:spPr>
           <a:xfrm>
-            <a:off x="7493000" y="2698750"/>
-            <a:ext cx="3556000" cy="3556000"/>
-          </a:xfrm>
-          <a:prstGeom prst="ellipse">
+            <a:off x="2749350" y="5632644"/>
+            <a:ext cx="3905450" cy="215444"/>
+          </a:xfrm>
+          <a:prstGeom prst="rect">
             <a:avLst/>
           </a:prstGeom>
-          <a:solidFill>
-            <a:srgbClr val="00B050"/>
-          </a:solidFill>
-        </p:spPr>
-        <p:style>
-          <a:lnRef idx="2">
-            <a:schemeClr val="accent1">
-              <a:shade val="50000"/>
-            </a:schemeClr>
-          </a:lnRef>
-          <a:fillRef idx="1">
-            <a:schemeClr val="accent1"/>
-          </a:fillRef>
-          <a:effectRef idx="0">
-            <a:schemeClr val="accent1"/>
-          </a:effectRef>
-          <a:fontRef idx="minor">
-            <a:schemeClr val="lt1"/>
-          </a:fontRef>
-        </p:style>
-        <p:txBody>
-          <a:bodyPr rtlCol="0" anchor="ctr"/>
-          <a:lstStyle/>
-          <a:p>
-            <a:pPr algn="ctr"/>
-            <a:endParaRPr lang="hu-HU"/>
-          </a:p>
-        </p:txBody>
-      </p:sp>
+          <a:noFill/>
+        </p:spPr>
+        <p:txBody>
+          <a:bodyPr wrap="square" rtlCol="0">
+            <a:spAutoFit/>
+          </a:bodyPr>
+          <a:lstStyle/>
+          <a:p>
+            <a:r>
+              <a:rPr lang="hu-HU" sz="800" dirty="0">
+                <a:hlinkClick r:id="rId2"/>
+              </a:rPr>
+              <a:t>https://seeklogo.com/vector-logo/380560/adobe-photoshop</a:t>
+            </a:r>
+            <a:endParaRPr lang="hu-HU" sz="800" dirty="0"/>
+          </a:p>
+        </p:txBody>
+      </p:sp>
+      <p:pic>
+        <p:nvPicPr>
+          <p:cNvPr id="9" name="Kép 8"/>
+          <p:cNvPicPr>
+            <a:picLocks noChangeAspect="1"/>
+          </p:cNvPicPr>
+          <p:nvPr/>
+        </p:nvPicPr>
+        <p:blipFill>
+          <a:blip r:embed="rId3">
+            <a:extLst>
+              <a:ext uri="{28A0092B-C50C-407E-A947-70E740481C1C}">
+                <a14:useLocalDpi xmlns:a14="http://schemas.microsoft.com/office/drawing/2010/main" val="0"/>
+              </a:ext>
+            </a:extLst>
+          </a:blip>
+          <a:stretch>
+            <a:fillRect/>
+          </a:stretch>
+        </p:blipFill>
+        <p:spPr>
+          <a:xfrm>
+            <a:off x="2749350" y="2850956"/>
+            <a:ext cx="2857899" cy="2781688"/>
+          </a:xfrm>
+          <a:prstGeom prst="rect">
+            <a:avLst/>
+          </a:prstGeom>
+        </p:spPr>
+      </p:pic>
     </p:spTree>
     <p:extLst>
       <p:ext uri="{BB962C8B-B14F-4D97-AF65-F5344CB8AC3E}">
@@ -3142,7 +3380,7 @@
   <p:clrMapOvr>
     <a:masterClrMapping/>
   </p:clrMapOvr>
-  <p:transition spd="slow">
+  <p:transition spd="med">
     <p:push/>
   </p:transition>
   <p:timing>
@@ -3180,15 +3418,18 @@
         </p:nvSpPr>
         <p:spPr>
           <a:xfrm>
-            <a:off x="0" y="4114800"/>
-            <a:ext cx="12192000" cy="723900"/>
+            <a:off x="0" y="4241800"/>
+            <a:ext cx="12192000" cy="114300"/>
           </a:xfrm>
           <a:prstGeom prst="rect">
             <a:avLst/>
           </a:prstGeom>
           <a:solidFill>
-            <a:srgbClr val="00B0F0"/>
+            <a:srgbClr val="9999FF"/>
           </a:solidFill>
+          <a:ln>
+            <a:noFill/>
+          </a:ln>
         </p:spPr>
         <p:style>
           <a:lnRef idx="2">
@@ -3215,62 +3456,90 @@
           </a:p>
         </p:txBody>
       </p:sp>
-      <p:sp>
-        <p:nvSpPr>
-          <p:cNvPr id="8" name="Ellipszis 7"/>
-          <p:cNvSpPr/>
+      <p:pic>
+        <p:nvPicPr>
+          <p:cNvPr id="4" name="Kép 3"/>
+          <p:cNvPicPr>
+            <a:picLocks noChangeAspect="1"/>
+          </p:cNvPicPr>
           <p:nvPr/>
-        </p:nvSpPr>
-        <p:spPr>
-          <a:xfrm>
-            <a:off x="7493000" y="2698750"/>
-            <a:ext cx="3556000" cy="3556000"/>
-          </a:xfrm>
-          <a:prstGeom prst="ellipse">
+        </p:nvPicPr>
+        <p:blipFill>
+          <a:blip r:embed="rId2">
+            <a:extLst>
+              <a:ext uri="{28A0092B-C50C-407E-A947-70E740481C1C}">
+                <a14:useLocalDpi xmlns:a14="http://schemas.microsoft.com/office/drawing/2010/main" val="0"/>
+              </a:ext>
+            </a:extLst>
+          </a:blip>
+          <a:stretch>
+            <a:fillRect/>
+          </a:stretch>
+        </p:blipFill>
+        <p:spPr>
+          <a:xfrm>
+            <a:off x="2749349" y="2850956"/>
+            <a:ext cx="2857899" cy="2781688"/>
+          </a:xfrm>
+          <a:prstGeom prst="rect">
             <a:avLst/>
           </a:prstGeom>
-          <a:solidFill>
-            <a:srgbClr val="00B0F0"/>
-          </a:solidFill>
-        </p:spPr>
-        <p:style>
-          <a:lnRef idx="2">
-            <a:schemeClr val="accent1">
-              <a:shade val="50000"/>
-            </a:schemeClr>
-          </a:lnRef>
-          <a:fillRef idx="1">
-            <a:schemeClr val="accent1"/>
-          </a:fillRef>
-          <a:effectRef idx="0">
-            <a:schemeClr val="accent1"/>
-          </a:effectRef>
-          <a:fontRef idx="minor">
-            <a:schemeClr val="lt1"/>
-          </a:fontRef>
-        </p:style>
-        <p:txBody>
-          <a:bodyPr rtlCol="0" anchor="ctr"/>
-          <a:lstStyle/>
-          <a:p>
-            <a:pPr algn="ctr"/>
-            <a:endParaRPr lang="hu-HU"/>
+        </p:spPr>
+      </p:pic>
+      <p:sp>
+        <p:nvSpPr>
+          <p:cNvPr id="5" name="Szövegdoboz 4"/>
+          <p:cNvSpPr txBox="1"/>
+          <p:nvPr/>
+        </p:nvSpPr>
+        <p:spPr>
+          <a:xfrm>
+            <a:off x="2749349" y="5639222"/>
+            <a:ext cx="3568700" cy="215444"/>
+          </a:xfrm>
+          <a:prstGeom prst="rect">
+            <a:avLst/>
+          </a:prstGeom>
+          <a:noFill/>
+        </p:spPr>
+        <p:txBody>
+          <a:bodyPr wrap="square" rtlCol="0">
+            <a:spAutoFit/>
+          </a:bodyPr>
+          <a:lstStyle/>
+          <a:p>
+            <a:r>
+              <a:rPr lang="hu-HU" sz="800" dirty="0">
+                <a:hlinkClick r:id="rId3"/>
+              </a:rPr>
+              <a:t>https://seeklogo.com/vector-logo/380789/adobe-premiere</a:t>
+            </a:r>
+            <a:endParaRPr lang="hu-HU" sz="800" dirty="0"/>
           </a:p>
         </p:txBody>
       </p:sp>
     </p:spTree>
     <p:extLst>
       <p:ext uri="{BB962C8B-B14F-4D97-AF65-F5344CB8AC3E}">
-        <p14:creationId xmlns:p14="http://schemas.microsoft.com/office/powerpoint/2010/main" val="2807204093"/>
+        <p14:creationId xmlns:p14="http://schemas.microsoft.com/office/powerpoint/2010/main" val="1612289633"/>
       </p:ext>
     </p:extLst>
   </p:cSld>
   <p:clrMapOvr>
     <a:masterClrMapping/>
   </p:clrMapOvr>
-  <p:transition spd="slow">
-    <p:push/>
-  </p:transition>
+  <mc:AlternateContent xmlns:mc="http://schemas.openxmlformats.org/markup-compatibility/2006">
+    <mc:Choice xmlns:p14="http://schemas.microsoft.com/office/powerpoint/2010/main" Requires="p14">
+      <p:transition spd="slow" p14:dur="1500">
+        <p:push/>
+      </p:transition>
+    </mc:Choice>
+    <mc:Fallback>
+      <p:transition spd="slow">
+        <p:push/>
+      </p:transition>
+    </mc:Fallback>
+  </mc:AlternateContent>
   <p:timing>
     <p:tnLst>
       <p:par>
@@ -3306,15 +3575,18 @@
         </p:nvSpPr>
         <p:spPr>
           <a:xfrm>
-            <a:off x="0" y="4114800"/>
-            <a:ext cx="12192000" cy="723900"/>
+            <a:off x="0" y="4241800"/>
+            <a:ext cx="12192000" cy="114300"/>
           </a:xfrm>
           <a:prstGeom prst="rect">
             <a:avLst/>
           </a:prstGeom>
           <a:solidFill>
-            <a:srgbClr val="0070C0"/>
+            <a:srgbClr val="9999FF"/>
           </a:solidFill>
+          <a:ln>
+            <a:noFill/>
+          </a:ln>
         </p:spPr>
         <p:style>
           <a:lnRef idx="2">
@@ -3341,62 +3613,90 @@
           </a:p>
         </p:txBody>
       </p:sp>
-      <p:sp>
-        <p:nvSpPr>
-          <p:cNvPr id="8" name="Ellipszis 7"/>
-          <p:cNvSpPr/>
+      <p:pic>
+        <p:nvPicPr>
+          <p:cNvPr id="4" name="Kép 3"/>
+          <p:cNvPicPr>
+            <a:picLocks noChangeAspect="1"/>
+          </p:cNvPicPr>
           <p:nvPr/>
-        </p:nvSpPr>
-        <p:spPr>
-          <a:xfrm>
-            <a:off x="7493000" y="2698750"/>
-            <a:ext cx="3556000" cy="3556000"/>
-          </a:xfrm>
-          <a:prstGeom prst="ellipse">
+        </p:nvPicPr>
+        <p:blipFill>
+          <a:blip r:embed="rId2" cstate="print">
+            <a:extLst>
+              <a:ext uri="{28A0092B-C50C-407E-A947-70E740481C1C}">
+                <a14:useLocalDpi xmlns:a14="http://schemas.microsoft.com/office/drawing/2010/main" val="0"/>
+              </a:ext>
+            </a:extLst>
+          </a:blip>
+          <a:stretch>
+            <a:fillRect/>
+          </a:stretch>
+        </p:blipFill>
+        <p:spPr>
+          <a:xfrm>
+            <a:off x="2749350" y="2850956"/>
+            <a:ext cx="2853675" cy="2781688"/>
+          </a:xfrm>
+          <a:prstGeom prst="rect">
             <a:avLst/>
           </a:prstGeom>
-          <a:solidFill>
-            <a:srgbClr val="0070C0"/>
-          </a:solidFill>
-        </p:spPr>
-        <p:style>
-          <a:lnRef idx="2">
-            <a:schemeClr val="accent1">
-              <a:shade val="50000"/>
-            </a:schemeClr>
-          </a:lnRef>
-          <a:fillRef idx="1">
-            <a:schemeClr val="accent1"/>
-          </a:fillRef>
-          <a:effectRef idx="0">
-            <a:schemeClr val="accent1"/>
-          </a:effectRef>
-          <a:fontRef idx="minor">
-            <a:schemeClr val="lt1"/>
-          </a:fontRef>
-        </p:style>
-        <p:txBody>
-          <a:bodyPr rtlCol="0" anchor="ctr"/>
-          <a:lstStyle/>
-          <a:p>
-            <a:pPr algn="ctr"/>
-            <a:endParaRPr lang="hu-HU"/>
+        </p:spPr>
+      </p:pic>
+      <p:sp>
+        <p:nvSpPr>
+          <p:cNvPr id="6" name="Szövegdoboz 5"/>
+          <p:cNvSpPr txBox="1"/>
+          <p:nvPr/>
+        </p:nvSpPr>
+        <p:spPr>
+          <a:xfrm>
+            <a:off x="2969687" y="5632644"/>
+            <a:ext cx="2413000" cy="338554"/>
+          </a:xfrm>
+          <a:prstGeom prst="rect">
+            <a:avLst/>
+          </a:prstGeom>
+          <a:noFill/>
+        </p:spPr>
+        <p:txBody>
+          <a:bodyPr wrap="square" rtlCol="0">
+            <a:spAutoFit/>
+          </a:bodyPr>
+          <a:lstStyle/>
+          <a:p>
+            <a:r>
+              <a:rPr lang="hu-HU" sz="800" dirty="0">
+                <a:hlinkClick r:id="rId3"/>
+              </a:rPr>
+              <a:t>https://commons.wikimedia.org/wiki/File:Adobe_After_Effects_CC_icon.svg</a:t>
+            </a:r>
+            <a:endParaRPr lang="hu-HU" sz="800" dirty="0"/>
           </a:p>
         </p:txBody>
       </p:sp>
     </p:spTree>
     <p:extLst>
       <p:ext uri="{BB962C8B-B14F-4D97-AF65-F5344CB8AC3E}">
-        <p14:creationId xmlns:p14="http://schemas.microsoft.com/office/powerpoint/2010/main" val="3934520646"/>
+        <p14:creationId xmlns:p14="http://schemas.microsoft.com/office/powerpoint/2010/main" val="3763855223"/>
       </p:ext>
     </p:extLst>
   </p:cSld>
   <p:clrMapOvr>
     <a:masterClrMapping/>
   </p:clrMapOvr>
-  <p:transition spd="slow">
-    <p:push/>
-  </p:transition>
+  <mc:AlternateContent xmlns:mc="http://schemas.openxmlformats.org/markup-compatibility/2006">
+    <mc:Choice xmlns:p14="http://schemas.microsoft.com/office/powerpoint/2010/main" Requires="p14">
+      <p:transition spd="slow" p14:dur="1500">
+        <p:push/>
+      </p:transition>
+    </mc:Choice>
+    <mc:Fallback>
+      <p:transition spd="slow">
+        <p:push/>
+      </p:transition>
+    </mc:Fallback>
+  </mc:AlternateContent>
   <p:timing>
     <p:tnLst>
       <p:par>
@@ -3432,15 +3732,18 @@
         </p:nvSpPr>
         <p:spPr>
           <a:xfrm>
-            <a:off x="0" y="4114800"/>
-            <a:ext cx="12192000" cy="723900"/>
+            <a:off x="0" y="4241800"/>
+            <a:ext cx="12192000" cy="114300"/>
           </a:xfrm>
           <a:prstGeom prst="rect">
             <a:avLst/>
           </a:prstGeom>
           <a:solidFill>
-            <a:srgbClr val="B000F6"/>
+            <a:srgbClr val="31A8FF"/>
           </a:solidFill>
+          <a:ln>
+            <a:noFill/>
+          </a:ln>
         </p:spPr>
         <p:style>
           <a:lnRef idx="2">
@@ -3467,62 +3770,90 @@
           </a:p>
         </p:txBody>
       </p:sp>
-      <p:sp>
-        <p:nvSpPr>
-          <p:cNvPr id="8" name="Ellipszis 7"/>
-          <p:cNvSpPr/>
+      <p:pic>
+        <p:nvPicPr>
+          <p:cNvPr id="4" name="Kép 3"/>
+          <p:cNvPicPr>
+            <a:picLocks noChangeAspect="1"/>
+          </p:cNvPicPr>
           <p:nvPr/>
-        </p:nvSpPr>
-        <p:spPr>
-          <a:xfrm>
-            <a:off x="7493000" y="2698750"/>
-            <a:ext cx="3556000" cy="3556000"/>
-          </a:xfrm>
-          <a:prstGeom prst="ellipse">
+        </p:nvPicPr>
+        <p:blipFill>
+          <a:blip r:embed="rId2" cstate="print">
+            <a:extLst>
+              <a:ext uri="{28A0092B-C50C-407E-A947-70E740481C1C}">
+                <a14:useLocalDpi xmlns:a14="http://schemas.microsoft.com/office/drawing/2010/main" val="0"/>
+              </a:ext>
+            </a:extLst>
+          </a:blip>
+          <a:stretch>
+            <a:fillRect/>
+          </a:stretch>
+        </p:blipFill>
+        <p:spPr>
+          <a:xfrm>
+            <a:off x="2749350" y="2850956"/>
+            <a:ext cx="2848144" cy="2781688"/>
+          </a:xfrm>
+          <a:prstGeom prst="rect">
             <a:avLst/>
           </a:prstGeom>
-          <a:solidFill>
-            <a:srgbClr val="B000F6"/>
-          </a:solidFill>
-        </p:spPr>
-        <p:style>
-          <a:lnRef idx="2">
-            <a:schemeClr val="accent1">
-              <a:shade val="50000"/>
-            </a:schemeClr>
-          </a:lnRef>
-          <a:fillRef idx="1">
-            <a:schemeClr val="accent1"/>
-          </a:fillRef>
-          <a:effectRef idx="0">
-            <a:schemeClr val="accent1"/>
-          </a:effectRef>
-          <a:fontRef idx="minor">
-            <a:schemeClr val="lt1"/>
-          </a:fontRef>
-        </p:style>
-        <p:txBody>
-          <a:bodyPr rtlCol="0" anchor="ctr"/>
-          <a:lstStyle/>
-          <a:p>
-            <a:pPr algn="ctr"/>
-            <a:endParaRPr lang="hu-HU"/>
+        </p:spPr>
+      </p:pic>
+      <p:sp>
+        <p:nvSpPr>
+          <p:cNvPr id="7" name="Szövegdoboz 6"/>
+          <p:cNvSpPr txBox="1"/>
+          <p:nvPr/>
+        </p:nvSpPr>
+        <p:spPr>
+          <a:xfrm>
+            <a:off x="2273300" y="5632644"/>
+            <a:ext cx="4991100" cy="215444"/>
+          </a:xfrm>
+          <a:prstGeom prst="rect">
+            <a:avLst/>
+          </a:prstGeom>
+          <a:noFill/>
+        </p:spPr>
+        <p:txBody>
+          <a:bodyPr wrap="square" rtlCol="0">
+            <a:spAutoFit/>
+          </a:bodyPr>
+          <a:lstStyle/>
+          <a:p>
+            <a:r>
+              <a:rPr lang="hu-HU" sz="800" dirty="0">
+                <a:hlinkClick r:id="rId3"/>
+              </a:rPr>
+              <a:t>https://hu.m.wikipedia.org/wiki/F%C3%A1jl:Adobe_Photoshop_Lightroom_CC_logo.svg</a:t>
+            </a:r>
+            <a:endParaRPr lang="hu-HU" sz="800" dirty="0"/>
           </a:p>
         </p:txBody>
       </p:sp>
     </p:spTree>
     <p:extLst>
       <p:ext uri="{BB962C8B-B14F-4D97-AF65-F5344CB8AC3E}">
-        <p14:creationId xmlns:p14="http://schemas.microsoft.com/office/powerpoint/2010/main" val="1135478870"/>
+        <p14:creationId xmlns:p14="http://schemas.microsoft.com/office/powerpoint/2010/main" val="238994123"/>
       </p:ext>
     </p:extLst>
   </p:cSld>
   <p:clrMapOvr>
     <a:masterClrMapping/>
   </p:clrMapOvr>
-  <p:transition spd="slow">
-    <p:push/>
-  </p:transition>
+  <mc:AlternateContent xmlns:mc="http://schemas.openxmlformats.org/markup-compatibility/2006">
+    <mc:Choice xmlns:p14="http://schemas.microsoft.com/office/powerpoint/2010/main" Requires="p14">
+      <p:transition spd="slow" p14:dur="1500">
+        <p:push/>
+      </p:transition>
+    </mc:Choice>
+    <mc:Fallback>
+      <p:transition spd="slow">
+        <p:push/>
+      </p:transition>
+    </mc:Fallback>
+  </mc:AlternateContent>
   <p:timing>
     <p:tnLst>
       <p:par>
@@ -3558,15 +3889,18 @@
         </p:nvSpPr>
         <p:spPr>
           <a:xfrm>
-            <a:off x="0" y="4114800"/>
-            <a:ext cx="12192000" cy="723900"/>
+            <a:off x="0" y="4241800"/>
+            <a:ext cx="12192000" cy="114300"/>
           </a:xfrm>
           <a:prstGeom prst="rect">
             <a:avLst/>
           </a:prstGeom>
           <a:solidFill>
-            <a:srgbClr val="FF1DE4"/>
+            <a:srgbClr val="FF9A00"/>
           </a:solidFill>
+          <a:ln>
+            <a:noFill/>
+          </a:ln>
         </p:spPr>
         <p:style>
           <a:lnRef idx="2">
@@ -3593,62 +3927,90 @@
           </a:p>
         </p:txBody>
       </p:sp>
-      <p:sp>
-        <p:nvSpPr>
-          <p:cNvPr id="8" name="Ellipszis 7"/>
-          <p:cNvSpPr/>
+      <p:pic>
+        <p:nvPicPr>
+          <p:cNvPr id="3" name="Kép 2"/>
+          <p:cNvPicPr>
+            <a:picLocks noChangeAspect="1"/>
+          </p:cNvPicPr>
           <p:nvPr/>
-        </p:nvSpPr>
-        <p:spPr>
-          <a:xfrm>
-            <a:off x="7493000" y="2698750"/>
-            <a:ext cx="3556000" cy="3556000"/>
-          </a:xfrm>
-          <a:prstGeom prst="ellipse">
+        </p:nvPicPr>
+        <p:blipFill>
+          <a:blip r:embed="rId2">
+            <a:extLst>
+              <a:ext uri="{28A0092B-C50C-407E-A947-70E740481C1C}">
+                <a14:useLocalDpi xmlns:a14="http://schemas.microsoft.com/office/drawing/2010/main" val="0"/>
+              </a:ext>
+            </a:extLst>
+          </a:blip>
+          <a:stretch>
+            <a:fillRect/>
+          </a:stretch>
+        </p:blipFill>
+        <p:spPr>
+          <a:xfrm>
+            <a:off x="2749350" y="2850956"/>
+            <a:ext cx="2857899" cy="2781688"/>
+          </a:xfrm>
+          <a:prstGeom prst="rect">
             <a:avLst/>
           </a:prstGeom>
-          <a:solidFill>
-            <a:srgbClr val="FF1DE4"/>
-          </a:solidFill>
-        </p:spPr>
-        <p:style>
-          <a:lnRef idx="2">
-            <a:schemeClr val="accent1">
-              <a:shade val="50000"/>
-            </a:schemeClr>
-          </a:lnRef>
-          <a:fillRef idx="1">
-            <a:schemeClr val="accent1"/>
-          </a:fillRef>
-          <a:effectRef idx="0">
-            <a:schemeClr val="accent1"/>
-          </a:effectRef>
-          <a:fontRef idx="minor">
-            <a:schemeClr val="lt1"/>
-          </a:fontRef>
-        </p:style>
-        <p:txBody>
-          <a:bodyPr rtlCol="0" anchor="ctr"/>
-          <a:lstStyle/>
-          <a:p>
-            <a:pPr algn="ctr"/>
-            <a:endParaRPr lang="hu-HU"/>
+        </p:spPr>
+      </p:pic>
+      <p:sp>
+        <p:nvSpPr>
+          <p:cNvPr id="6" name="Szövegdoboz 5"/>
+          <p:cNvSpPr txBox="1"/>
+          <p:nvPr/>
+        </p:nvSpPr>
+        <p:spPr>
+          <a:xfrm>
+            <a:off x="2882900" y="5639222"/>
+            <a:ext cx="2832100" cy="215444"/>
+          </a:xfrm>
+          <a:prstGeom prst="rect">
+            <a:avLst/>
+          </a:prstGeom>
+          <a:noFill/>
+        </p:spPr>
+        <p:txBody>
+          <a:bodyPr wrap="square" rtlCol="0">
+            <a:spAutoFit/>
+          </a:bodyPr>
+          <a:lstStyle/>
+          <a:p>
+            <a:r>
+              <a:rPr lang="hu-HU" sz="800" dirty="0" smtClean="0">
+                <a:hlinkClick r:id="rId3"/>
+              </a:rPr>
+              <a:t>https://seeklogo.com/vector-logo/380559/adobe-illustrator</a:t>
+            </a:r>
+            <a:endParaRPr lang="hu-HU" sz="800" dirty="0"/>
           </a:p>
         </p:txBody>
       </p:sp>
     </p:spTree>
     <p:extLst>
       <p:ext uri="{BB962C8B-B14F-4D97-AF65-F5344CB8AC3E}">
-        <p14:creationId xmlns:p14="http://schemas.microsoft.com/office/powerpoint/2010/main" val="483133889"/>
+        <p14:creationId xmlns:p14="http://schemas.microsoft.com/office/powerpoint/2010/main" val="735547391"/>
       </p:ext>
     </p:extLst>
   </p:cSld>
   <p:clrMapOvr>
     <a:masterClrMapping/>
   </p:clrMapOvr>
-  <p:transition spd="slow">
-    <p:push/>
-  </p:transition>
+  <mc:AlternateContent xmlns:mc="http://schemas.openxmlformats.org/markup-compatibility/2006">
+    <mc:Choice xmlns:p14="http://schemas.microsoft.com/office/powerpoint/2010/main" Requires="p14">
+      <p:transition spd="slow" p14:dur="1500">
+        <p:push/>
+      </p:transition>
+    </mc:Choice>
+    <mc:Fallback>
+      <p:transition spd="slow">
+        <p:push/>
+      </p:transition>
+    </mc:Fallback>
+  </mc:AlternateContent>
   <p:timing>
     <p:tnLst>
       <p:par>
@@ -3684,8 +4046,8 @@
         </p:nvSpPr>
         <p:spPr>
           <a:xfrm>
-            <a:off x="0" y="4114800"/>
-            <a:ext cx="12192000" cy="723900"/>
+            <a:off x="0" y="4241800"/>
+            <a:ext cx="12192000" cy="114300"/>
           </a:xfrm>
           <a:prstGeom prst="rect">
             <a:avLst/>
@@ -3693,6 +4055,9 @@
           <a:solidFill>
             <a:srgbClr val="FF0000"/>
           </a:solidFill>
+          <a:ln>
+            <a:noFill/>
+          </a:ln>
         </p:spPr>
         <p:style>
           <a:lnRef idx="2">
@@ -3719,62 +4084,92 @@
           </a:p>
         </p:txBody>
       </p:sp>
-      <p:sp>
-        <p:nvSpPr>
-          <p:cNvPr id="8" name="Ellipszis 7"/>
-          <p:cNvSpPr/>
+      <p:pic>
+        <p:nvPicPr>
+          <p:cNvPr id="7" name="Kép 6">
+            <a:hlinkClick r:id="rId2"/>
+          </p:cNvPr>
+          <p:cNvPicPr>
+            <a:picLocks noChangeAspect="1"/>
+          </p:cNvPicPr>
           <p:nvPr/>
-        </p:nvSpPr>
-        <p:spPr>
-          <a:xfrm>
-            <a:off x="7493000" y="2698750"/>
-            <a:ext cx="3556000" cy="3556000"/>
-          </a:xfrm>
-          <a:prstGeom prst="ellipse">
+        </p:nvPicPr>
+        <p:blipFill>
+          <a:blip r:embed="rId3">
+            <a:extLst>
+              <a:ext uri="{28A0092B-C50C-407E-A947-70E740481C1C}">
+                <a14:useLocalDpi xmlns:a14="http://schemas.microsoft.com/office/drawing/2010/main" val="0"/>
+              </a:ext>
+            </a:extLst>
+          </a:blip>
+          <a:stretch>
+            <a:fillRect/>
+          </a:stretch>
+        </p:blipFill>
+        <p:spPr>
+          <a:xfrm>
+            <a:off x="2411769" y="2457650"/>
+            <a:ext cx="3568294" cy="3568294"/>
+          </a:xfrm>
+          <a:prstGeom prst="rect">
             <a:avLst/>
           </a:prstGeom>
-          <a:solidFill>
-            <a:srgbClr val="FF0000"/>
-          </a:solidFill>
-        </p:spPr>
-        <p:style>
-          <a:lnRef idx="2">
-            <a:schemeClr val="accent1">
-              <a:shade val="50000"/>
-            </a:schemeClr>
-          </a:lnRef>
-          <a:fillRef idx="1">
-            <a:schemeClr val="accent1"/>
-          </a:fillRef>
-          <a:effectRef idx="0">
-            <a:schemeClr val="accent1"/>
-          </a:effectRef>
-          <a:fontRef idx="minor">
-            <a:schemeClr val="lt1"/>
-          </a:fontRef>
-        </p:style>
-        <p:txBody>
-          <a:bodyPr rtlCol="0" anchor="ctr"/>
-          <a:lstStyle/>
-          <a:p>
-            <a:pPr algn="ctr"/>
-            <a:endParaRPr lang="hu-HU"/>
+        </p:spPr>
+      </p:pic>
+      <p:sp>
+        <p:nvSpPr>
+          <p:cNvPr id="9" name="Szövegdoboz 8"/>
+          <p:cNvSpPr txBox="1"/>
+          <p:nvPr/>
+        </p:nvSpPr>
+        <p:spPr>
+          <a:xfrm>
+            <a:off x="2849716" y="5549900"/>
+            <a:ext cx="2692400" cy="338554"/>
+          </a:xfrm>
+          <a:prstGeom prst="rect">
+            <a:avLst/>
+          </a:prstGeom>
+          <a:noFill/>
+        </p:spPr>
+        <p:txBody>
+          <a:bodyPr wrap="square" rtlCol="0">
+            <a:spAutoFit/>
+          </a:bodyPr>
+          <a:lstStyle/>
+          <a:p>
+            <a:r>
+              <a:rPr lang="hu-HU" sz="800" dirty="0" smtClean="0">
+                <a:hlinkClick r:id="rId2"/>
+              </a:rPr>
+              <a:t>www.likento.com/similarities/5de4be60f03b1600170b103d/details</a:t>
+            </a:r>
+            <a:endParaRPr lang="hu-HU" sz="800" dirty="0"/>
           </a:p>
         </p:txBody>
       </p:sp>
     </p:spTree>
     <p:extLst>
       <p:ext uri="{BB962C8B-B14F-4D97-AF65-F5344CB8AC3E}">
-        <p14:creationId xmlns:p14="http://schemas.microsoft.com/office/powerpoint/2010/main" val="1343585880"/>
+        <p14:creationId xmlns:p14="http://schemas.microsoft.com/office/powerpoint/2010/main" val="676245274"/>
       </p:ext>
     </p:extLst>
   </p:cSld>
   <p:clrMapOvr>
     <a:masterClrMapping/>
   </p:clrMapOvr>
-  <p:transition spd="slow">
-    <p:push/>
-  </p:transition>
+  <mc:AlternateContent xmlns:mc="http://schemas.openxmlformats.org/markup-compatibility/2006">
+    <mc:Choice xmlns:p14="http://schemas.microsoft.com/office/powerpoint/2010/main" Requires="p14">
+      <p:transition spd="slow" p14:dur="1500">
+        <p:push/>
+      </p:transition>
+    </mc:Choice>
+    <mc:Fallback>
+      <p:transition spd="slow">
+        <p:push/>
+      </p:transition>
+    </mc:Fallback>
+  </mc:AlternateContent>
   <p:timing>
     <p:tnLst>
       <p:par>
@@ -3810,15 +4205,18 @@
         </p:nvSpPr>
         <p:spPr>
           <a:xfrm>
-            <a:off x="0" y="4114800"/>
-            <a:ext cx="12192000" cy="723900"/>
+            <a:off x="0" y="4241800"/>
+            <a:ext cx="12192000" cy="114300"/>
           </a:xfrm>
           <a:prstGeom prst="rect">
             <a:avLst/>
           </a:prstGeom>
           <a:solidFill>
-            <a:srgbClr val="FFC000"/>
+            <a:srgbClr val="FF61F6"/>
           </a:solidFill>
+          <a:ln>
+            <a:noFill/>
+          </a:ln>
         </p:spPr>
         <p:style>
           <a:lnRef idx="2">
@@ -3845,23 +4243,197 @@
           </a:p>
         </p:txBody>
       </p:sp>
-      <p:sp>
-        <p:nvSpPr>
-          <p:cNvPr id="8" name="Ellipszis 7"/>
+      <p:pic>
+        <p:nvPicPr>
+          <p:cNvPr id="5" name="Kép 4"/>
+          <p:cNvPicPr>
+            <a:picLocks noChangeAspect="1"/>
+          </p:cNvPicPr>
+          <p:nvPr/>
+        </p:nvPicPr>
+        <p:blipFill>
+          <a:blip r:embed="rId2" cstate="print">
+            <a:extLst>
+              <a:ext uri="{28A0092B-C50C-407E-A947-70E740481C1C}">
+                <a14:useLocalDpi xmlns:a14="http://schemas.microsoft.com/office/drawing/2010/main" val="0"/>
+              </a:ext>
+            </a:extLst>
+          </a:blip>
+          <a:stretch>
+            <a:fillRect/>
+          </a:stretch>
+        </p:blipFill>
+        <p:spPr>
+          <a:xfrm>
+            <a:off x="2749350" y="2908105"/>
+            <a:ext cx="2853675" cy="2781687"/>
+          </a:xfrm>
+          <a:prstGeom prst="rect">
+            <a:avLst/>
+          </a:prstGeom>
+        </p:spPr>
+      </p:pic>
+      <p:sp>
+        <p:nvSpPr>
+          <p:cNvPr id="6" name="Szövegdoboz 5"/>
+          <p:cNvSpPr txBox="1"/>
+          <p:nvPr/>
+        </p:nvSpPr>
+        <p:spPr>
+          <a:xfrm>
+            <a:off x="2882900" y="5689792"/>
+            <a:ext cx="2603500" cy="338554"/>
+          </a:xfrm>
+          <a:prstGeom prst="rect">
+            <a:avLst/>
+          </a:prstGeom>
+          <a:noFill/>
+        </p:spPr>
+        <p:txBody>
+          <a:bodyPr wrap="square" rtlCol="0">
+            <a:spAutoFit/>
+          </a:bodyPr>
+          <a:lstStyle/>
+          <a:p>
+            <a:r>
+              <a:rPr lang="hu-HU" sz="800" dirty="0">
+                <a:hlinkClick r:id="rId3"/>
+              </a:rPr>
+              <a:t>https://commons.wikimedia.org/wiki/File:Adobe_XD_CC_icon.svg</a:t>
+            </a:r>
+            <a:endParaRPr lang="hu-HU" sz="800" dirty="0"/>
+          </a:p>
+        </p:txBody>
+      </p:sp>
+    </p:spTree>
+    <p:extLst>
+      <p:ext uri="{BB962C8B-B14F-4D97-AF65-F5344CB8AC3E}">
+        <p14:creationId xmlns:p14="http://schemas.microsoft.com/office/powerpoint/2010/main" val="3188329268"/>
+      </p:ext>
+    </p:extLst>
+  </p:cSld>
+  <p:clrMapOvr>
+    <a:masterClrMapping/>
+  </p:clrMapOvr>
+  <mc:AlternateContent xmlns:mc="http://schemas.openxmlformats.org/markup-compatibility/2006">
+    <mc:Choice xmlns:p14="http://schemas.microsoft.com/office/powerpoint/2010/main" Requires="p14">
+      <p:transition spd="slow" p14:dur="1500">
+        <p:push/>
+      </p:transition>
+    </mc:Choice>
+    <mc:Fallback>
+      <p:transition spd="slow">
+        <p:push/>
+      </p:transition>
+    </mc:Fallback>
+  </mc:AlternateContent>
+  <p:timing>
+    <p:tnLst>
+      <p:par>
+        <p:cTn id="1" dur="indefinite" restart="never" nodeType="tmRoot"/>
+      </p:par>
+    </p:tnLst>
+  </p:timing>
+</p:sld>
+</file>
+
+<file path=ppt/slides/slide9.xml><?xml version="1.0" encoding="utf-8"?>
+<p:sld xmlns:a="http://schemas.openxmlformats.org/drawingml/2006/main" xmlns:r="http://schemas.openxmlformats.org/officeDocument/2006/relationships" xmlns:p="http://schemas.openxmlformats.org/presentationml/2006/main">
+  <p:cSld>
+    <p:spTree>
+      <p:nvGrpSpPr>
+        <p:cNvPr id="1" name=""/>
+        <p:cNvGrpSpPr/>
+        <p:nvPr/>
+      </p:nvGrpSpPr>
+      <p:grpSpPr>
+        <a:xfrm>
+          <a:off x="0" y="0"/>
+          <a:ext cx="0" cy="0"/>
+          <a:chOff x="0" y="0"/>
+          <a:chExt cx="0" cy="0"/>
+        </a:xfrm>
+      </p:grpSpPr>
+      <p:sp>
+        <p:nvSpPr>
+          <p:cNvPr id="3" name="Szövegdoboz 2"/>
+          <p:cNvSpPr txBox="1"/>
+          <p:nvPr/>
+        </p:nvSpPr>
+        <p:spPr>
+          <a:xfrm>
+            <a:off x="3073400" y="1778000"/>
+            <a:ext cx="7112000" cy="830997"/>
+          </a:xfrm>
+          <a:prstGeom prst="rect">
+            <a:avLst/>
+          </a:prstGeom>
+          <a:noFill/>
+        </p:spPr>
+        <p:txBody>
+          <a:bodyPr wrap="square" rtlCol="0">
+            <a:spAutoFit/>
+          </a:bodyPr>
+          <a:lstStyle/>
+          <a:p>
+            <a:r>
+              <a:rPr lang="hu-HU" sz="4800" dirty="0" smtClean="0"/>
+              <a:t>Köszönöm a figyelmet!</a:t>
+            </a:r>
+            <a:endParaRPr lang="hu-HU" sz="4800" dirty="0"/>
+          </a:p>
+        </p:txBody>
+      </p:sp>
+      <p:sp>
+        <p:nvSpPr>
+          <p:cNvPr id="6" name="Szövegdoboz 5"/>
+          <p:cNvSpPr txBox="1"/>
+          <p:nvPr/>
+        </p:nvSpPr>
+        <p:spPr>
+          <a:xfrm>
+            <a:off x="4546600" y="4584700"/>
+            <a:ext cx="7112000" cy="461665"/>
+          </a:xfrm>
+          <a:prstGeom prst="rect">
+            <a:avLst/>
+          </a:prstGeom>
+          <a:noFill/>
+        </p:spPr>
+        <p:txBody>
+          <a:bodyPr wrap="square" rtlCol="0">
+            <a:spAutoFit/>
+          </a:bodyPr>
+          <a:lstStyle/>
+          <a:p>
+            <a:r>
+              <a:rPr lang="hu-HU" sz="2400" dirty="0" smtClean="0"/>
+              <a:t>Készítette: Tarr Gábor</a:t>
+            </a:r>
+            <a:endParaRPr lang="hu-HU" sz="2400" dirty="0"/>
+          </a:p>
+        </p:txBody>
+      </p:sp>
+      <p:sp>
+        <p:nvSpPr>
+          <p:cNvPr id="7" name="Téglalap 6"/>
           <p:cNvSpPr/>
           <p:nvPr/>
         </p:nvSpPr>
         <p:spPr>
           <a:xfrm>
-            <a:off x="7493000" y="2698750"/>
-            <a:ext cx="3556000" cy="3556000"/>
-          </a:xfrm>
-          <a:prstGeom prst="ellipse">
+            <a:off x="0" y="4241800"/>
+            <a:ext cx="12192000" cy="114300"/>
+          </a:xfrm>
+          <a:prstGeom prst="rect">
             <a:avLst/>
           </a:prstGeom>
           <a:solidFill>
-            <a:srgbClr val="FFC000"/>
+            <a:schemeClr val="tx1"/>
           </a:solidFill>
+          <a:ln>
+            <a:noFill/>
+          </a:ln>
         </p:spPr>
         <p:style>
           <a:lnRef idx="2">
@@ -3888,19 +4460,67 @@
           </a:p>
         </p:txBody>
       </p:sp>
+      <p:sp>
+        <p:nvSpPr>
+          <p:cNvPr id="4" name="Szövegdoboz 3"/>
+          <p:cNvSpPr txBox="1"/>
+          <p:nvPr/>
+        </p:nvSpPr>
+        <p:spPr>
+          <a:xfrm>
+            <a:off x="381000" y="5918200"/>
+            <a:ext cx="6591300" cy="646331"/>
+          </a:xfrm>
+          <a:prstGeom prst="rect">
+            <a:avLst/>
+          </a:prstGeom>
+          <a:noFill/>
+        </p:spPr>
+        <p:txBody>
+          <a:bodyPr wrap="square" rtlCol="0">
+            <a:spAutoFit/>
+          </a:bodyPr>
+          <a:lstStyle/>
+          <a:p>
+            <a:r>
+              <a:rPr lang="hu-HU" dirty="0" smtClean="0"/>
+              <a:t>Forrás: </a:t>
+            </a:r>
+            <a:r>
+              <a:rPr lang="hu-HU" dirty="0">
+                <a:hlinkClick r:id="rId2"/>
+              </a:rPr>
+              <a:t>https://www.adobe.com/hu/products/catalog.html</a:t>
+            </a:r>
+            <a:endParaRPr lang="hu-HU" dirty="0"/>
+          </a:p>
+          <a:p>
+            <a:endParaRPr lang="hu-HU" dirty="0"/>
+          </a:p>
+        </p:txBody>
+      </p:sp>
     </p:spTree>
     <p:extLst>
       <p:ext uri="{BB962C8B-B14F-4D97-AF65-F5344CB8AC3E}">
-        <p14:creationId xmlns:p14="http://schemas.microsoft.com/office/powerpoint/2010/main" val="302615761"/>
+        <p14:creationId xmlns:p14="http://schemas.microsoft.com/office/powerpoint/2010/main" val="2000260441"/>
       </p:ext>
     </p:extLst>
   </p:cSld>
   <p:clrMapOvr>
     <a:masterClrMapping/>
   </p:clrMapOvr>
-  <p:transition spd="slow">
-    <p:push/>
-  </p:transition>
+  <mc:AlternateContent xmlns:mc="http://schemas.openxmlformats.org/markup-compatibility/2006">
+    <mc:Choice xmlns:p14="http://schemas.microsoft.com/office/powerpoint/2010/main" Requires="p14">
+      <p:transition spd="slow" p14:dur="1500">
+        <p:push/>
+      </p:transition>
+    </mc:Choice>
+    <mc:Fallback>
+      <p:transition spd="slow">
+        <p:push/>
+      </p:transition>
+    </mc:Fallback>
+  </mc:AlternateContent>
   <p:timing>
     <p:tnLst>
       <p:par>
@@ -3912,9 +4532,9 @@
 </file>
 
 <file path=ppt/theme/theme1.xml><?xml version="1.0" encoding="utf-8"?>
-<a:theme xmlns:a="http://schemas.openxmlformats.org/drawingml/2006/main" name="Office-téma">
+<a:theme xmlns:a="http://schemas.openxmlformats.org/drawingml/2006/main" name="Office Theme">
   <a:themeElements>
-    <a:clrScheme name="Office">
+    <a:clrScheme name="Lila">
       <a:dk1>
         <a:sysClr val="windowText" lastClr="000000"/>
       </a:dk1>
@@ -3922,37 +4542,37 @@
         <a:sysClr val="window" lastClr="FFFFFF"/>
       </a:lt1>
       <a:dk2>
-        <a:srgbClr val="44546A"/>
+        <a:srgbClr val="373545"/>
       </a:dk2>
       <a:lt2>
-        <a:srgbClr val="E7E6E6"/>
+        <a:srgbClr val="DCD8DC"/>
       </a:lt2>
       <a:accent1>
-        <a:srgbClr val="5B9BD5"/>
+        <a:srgbClr val="AD84C6"/>
       </a:accent1>
       <a:accent2>
-        <a:srgbClr val="ED7D31"/>
+        <a:srgbClr val="8784C7"/>
       </a:accent2>
       <a:accent3>
-        <a:srgbClr val="A5A5A5"/>
+        <a:srgbClr val="5D739A"/>
       </a:accent3>
       <a:accent4>
-        <a:srgbClr val="FFC000"/>
+        <a:srgbClr val="6997AF"/>
       </a:accent4>
       <a:accent5>
-        <a:srgbClr val="4472C4"/>
+        <a:srgbClr val="84ACB6"/>
       </a:accent5>
       <a:accent6>
-        <a:srgbClr val="70AD47"/>
+        <a:srgbClr val="6F8183"/>
       </a:accent6>
       <a:hlink>
-        <a:srgbClr val="0563C1"/>
+        <a:srgbClr val="69A020"/>
       </a:hlink>
       <a:folHlink>
-        <a:srgbClr val="954F72"/>
+        <a:srgbClr val="8C8C8C"/>
       </a:folHlink>
     </a:clrScheme>
-    <a:fontScheme name="Office">
+    <a:fontScheme name="Office-téma">
       <a:majorFont>
         <a:latin typeface="Calibri Light" panose="020F0302020204030204"/>
         <a:ea typeface=""/>
@@ -4024,7 +4644,7 @@
         <a:font script="Geor" typeface="Sylfaen"/>
       </a:minorFont>
     </a:fontScheme>
-    <a:fmtScheme name="Office">
+    <a:fmtScheme name="Office-téma">
       <a:fillStyleLst>
         <a:solidFill>
           <a:schemeClr val="phClr"/>

</xml_diff>

<commit_message>
A html teljesen kész van, a css még nem
</commit_message>
<xml_diff>
--- a/beadandóTG.pptx
+++ b/beadandóTG.pptx
@@ -3032,7 +3032,7 @@
             <a:avLst/>
           </a:prstGeom>
           <a:solidFill>
-            <a:schemeClr val="tx1"/>
+            <a:srgbClr val="ED1C24"/>
           </a:solidFill>
           <a:ln>
             <a:noFill/>
@@ -3329,6 +3329,38 @@
           </a:p>
         </p:txBody>
       </p:sp>
+      <p:sp>
+        <p:nvSpPr>
+          <p:cNvPr id="2" name="Szövegdoboz 1"/>
+          <p:cNvSpPr txBox="1"/>
+          <p:nvPr/>
+        </p:nvSpPr>
+        <p:spPr>
+          <a:xfrm>
+            <a:off x="2768600" y="5746944"/>
+            <a:ext cx="4013200" cy="215444"/>
+          </a:xfrm>
+          <a:prstGeom prst="rect">
+            <a:avLst/>
+          </a:prstGeom>
+          <a:noFill/>
+        </p:spPr>
+        <p:txBody>
+          <a:bodyPr wrap="square" rtlCol="0">
+            <a:spAutoFit/>
+          </a:bodyPr>
+          <a:lstStyle/>
+          <a:p>
+            <a:r>
+              <a:rPr lang="hu-HU" sz="800" dirty="0">
+                <a:hlinkClick r:id="rId3"/>
+              </a:rPr>
+              <a:t>https://www.kindpng.com/imgv/JimTwJ_adobe-logo-2019-png-transparent-png/</a:t>
+            </a:r>
+            <a:endParaRPr lang="hu-HU" sz="800" dirty="0"/>
+          </a:p>
+        </p:txBody>
+      </p:sp>
     </p:spTree>
     <p:extLst>
       <p:ext uri="{BB962C8B-B14F-4D97-AF65-F5344CB8AC3E}">
@@ -3339,11 +3371,11 @@
   <p:clrMapOvr>
     <a:masterClrMapping/>
   </p:clrMapOvr>
-  <mc:AlternateContent xmlns:mc="http://schemas.openxmlformats.org/markup-compatibility/2006">
-    <mc:Choice xmlns:p14="http://schemas.microsoft.com/office/powerpoint/2010/main" Requires="p14">
+  <mc:AlternateContent xmlns:mc="http://schemas.openxmlformats.org/markup-compatibility/2006" xmlns:p14="http://schemas.microsoft.com/office/powerpoint/2010/main">
+    <mc:Choice Requires="p14">
       <p:transition p14:dur="0"/>
     </mc:Choice>
-    <mc:Fallback>
+    <mc:Fallback xmlns="">
       <p:transition/>
     </mc:Fallback>
   </mc:AlternateContent>
@@ -4237,7 +4269,7 @@
         </p:nvSpPr>
         <p:spPr>
           <a:xfrm>
-            <a:off x="6096000" y="968960"/>
+            <a:off x="6036368" y="946273"/>
             <a:ext cx="3517900" cy="215444"/>
           </a:xfrm>
           <a:prstGeom prst="rect">

</xml_diff>